<commit_message>
poster 2 with all dtrees
</commit_message>
<xml_diff>
--- a/poster/poster2.pptx
+++ b/poster/poster2.pptx
@@ -108,1841 +108,6 @@
     </a:lvl9pPr>
   </p:defaultTextStyle>
 </p:presentation>
-</file>
-
-<file path=ppt/charts/chart1.xml><?xml version="1.0" encoding="utf-8"?>
-<c:chartSpace xmlns:c="http://schemas.openxmlformats.org/drawingml/2006/chart" xmlns:a="http://schemas.openxmlformats.org/drawingml/2006/main" xmlns:r="http://schemas.openxmlformats.org/officeDocument/2006/relationships">
-  <c:date1904 val="0"/>
-  <c:lang val="en-US"/>
-  <c:roundedCorners val="0"/>
-  <mc:AlternateContent xmlns:mc="http://schemas.openxmlformats.org/markup-compatibility/2006">
-    <mc:Choice xmlns:c14="http://schemas.microsoft.com/office/drawing/2007/8/2/chart" Requires="c14">
-      <c14:style val="118"/>
-    </mc:Choice>
-    <mc:Fallback>
-      <c:style val="18"/>
-    </mc:Fallback>
-  </mc:AlternateContent>
-  <c:chart>
-    <c:title>
-      <c:tx>
-        <c:rich>
-          <a:bodyPr/>
-          <a:lstStyle/>
-          <a:p>
-            <a:pPr>
-              <a:defRPr/>
-            </a:pPr>
-            <a:r>
-              <a:rPr lang="en-US"/>
-              <a:t>Average Minimum Incarceration Times by Race</a:t>
-            </a:r>
-          </a:p>
-        </c:rich>
-      </c:tx>
-      <c:layout/>
-      <c:overlay val="0"/>
-    </c:title>
-    <c:autoTitleDeleted val="0"/>
-    <c:plotArea>
-      <c:layout/>
-      <c:barChart>
-        <c:barDir val="col"/>
-        <c:grouping val="clustered"/>
-        <c:varyColors val="0"/>
-        <c:ser>
-          <c:idx val="0"/>
-          <c:order val="0"/>
-          <c:tx>
-            <c:strRef>
-              <c:f>'Average INCMIN by Race'!$A$5</c:f>
-              <c:strCache>
-                <c:ptCount val="1"/>
-                <c:pt idx="0">
-                  <c:v>Felony</c:v>
-                </c:pt>
-              </c:strCache>
-            </c:strRef>
-          </c:tx>
-          <c:invertIfNegative val="0"/>
-          <c:cat>
-            <c:strRef>
-              <c:f>'Average INCMIN by Race'!$B$4:$H$4</c:f>
-              <c:strCache>
-                <c:ptCount val="7"/>
-                <c:pt idx="0">
-                  <c:v>Am Indian</c:v>
-                </c:pt>
-                <c:pt idx="1">
-                  <c:v>Asian</c:v>
-                </c:pt>
-                <c:pt idx="2">
-                  <c:v>Black</c:v>
-                </c:pt>
-                <c:pt idx="3">
-                  <c:v>Hispanic</c:v>
-                </c:pt>
-                <c:pt idx="4">
-                  <c:v>Other</c:v>
-                </c:pt>
-                <c:pt idx="5">
-                  <c:v>Unknown</c:v>
-                </c:pt>
-                <c:pt idx="6">
-                  <c:v>White</c:v>
-                </c:pt>
-              </c:strCache>
-            </c:strRef>
-          </c:cat>
-          <c:val>
-            <c:numRef>
-              <c:f>'Average INCMIN by Race'!$B$5:$H$5</c:f>
-              <c:numCache>
-                <c:formatCode>General</c:formatCode>
-                <c:ptCount val="7"/>
-                <c:pt idx="0">
-                  <c:v>25.5</c:v>
-                </c:pt>
-                <c:pt idx="1">
-                  <c:v>33.28826923076923</c:v>
-                </c:pt>
-                <c:pt idx="2">
-                  <c:v>24.69579226686886</c:v>
-                </c:pt>
-                <c:pt idx="3">
-                  <c:v>24.7244891304348</c:v>
-                </c:pt>
-                <c:pt idx="4">
-                  <c:v>13.55178571428571</c:v>
-                </c:pt>
-                <c:pt idx="5">
-                  <c:v>27.25244239631329</c:v>
-                </c:pt>
-                <c:pt idx="6">
-                  <c:v>20.26961669092671</c:v>
-                </c:pt>
-              </c:numCache>
-            </c:numRef>
-          </c:val>
-        </c:ser>
-        <c:ser>
-          <c:idx val="1"/>
-          <c:order val="1"/>
-          <c:tx>
-            <c:strRef>
-              <c:f>'Average INCMIN by Race'!$A$6</c:f>
-              <c:strCache>
-                <c:ptCount val="1"/>
-                <c:pt idx="0">
-                  <c:v>Misdemeanor</c:v>
-                </c:pt>
-              </c:strCache>
-            </c:strRef>
-          </c:tx>
-          <c:invertIfNegative val="0"/>
-          <c:cat>
-            <c:strRef>
-              <c:f>'Average INCMIN by Race'!$B$4:$H$4</c:f>
-              <c:strCache>
-                <c:ptCount val="7"/>
-                <c:pt idx="0">
-                  <c:v>Am Indian</c:v>
-                </c:pt>
-                <c:pt idx="1">
-                  <c:v>Asian</c:v>
-                </c:pt>
-                <c:pt idx="2">
-                  <c:v>Black</c:v>
-                </c:pt>
-                <c:pt idx="3">
-                  <c:v>Hispanic</c:v>
-                </c:pt>
-                <c:pt idx="4">
-                  <c:v>Other</c:v>
-                </c:pt>
-                <c:pt idx="5">
-                  <c:v>Unknown</c:v>
-                </c:pt>
-                <c:pt idx="6">
-                  <c:v>White</c:v>
-                </c:pt>
-              </c:strCache>
-            </c:strRef>
-          </c:cat>
-          <c:val>
-            <c:numRef>
-              <c:f>'Average INCMIN by Race'!$B$6:$H$6</c:f>
-              <c:numCache>
-                <c:formatCode>General</c:formatCode>
-                <c:ptCount val="7"/>
-                <c:pt idx="0">
-                  <c:v>2.800952380952381</c:v>
-                </c:pt>
-                <c:pt idx="1">
-                  <c:v>26.26441860465115</c:v>
-                </c:pt>
-                <c:pt idx="2">
-                  <c:v>24.18011838697742</c:v>
-                </c:pt>
-                <c:pt idx="3">
-                  <c:v>30.78952145214518</c:v>
-                </c:pt>
-                <c:pt idx="4">
-                  <c:v>1.9</c:v>
-                </c:pt>
-                <c:pt idx="5">
-                  <c:v>10.3629702970297</c:v>
-                </c:pt>
-                <c:pt idx="6">
-                  <c:v>8.152829471733541</c:v>
-                </c:pt>
-              </c:numCache>
-            </c:numRef>
-          </c:val>
-        </c:ser>
-        <c:dLbls>
-          <c:showLegendKey val="0"/>
-          <c:showVal val="0"/>
-          <c:showCatName val="0"/>
-          <c:showSerName val="0"/>
-          <c:showPercent val="0"/>
-          <c:showBubbleSize val="0"/>
-        </c:dLbls>
-        <c:gapWidth val="150"/>
-        <c:axId val="553199560"/>
-        <c:axId val="553205064"/>
-      </c:barChart>
-      <c:catAx>
-        <c:axId val="553199560"/>
-        <c:scaling>
-          <c:orientation val="minMax"/>
-        </c:scaling>
-        <c:delete val="0"/>
-        <c:axPos val="b"/>
-        <c:title>
-          <c:tx>
-            <c:rich>
-              <a:bodyPr/>
-              <a:lstStyle/>
-              <a:p>
-                <a:pPr>
-                  <a:defRPr sz="1800"/>
-                </a:pPr>
-                <a:r>
-                  <a:rPr lang="en-US" sz="1800"/>
-                  <a:t>Race</a:t>
-                </a:r>
-              </a:p>
-            </c:rich>
-          </c:tx>
-          <c:layout/>
-          <c:overlay val="0"/>
-        </c:title>
-        <c:majorTickMark val="out"/>
-        <c:minorTickMark val="none"/>
-        <c:tickLblPos val="nextTo"/>
-        <c:txPr>
-          <a:bodyPr/>
-          <a:lstStyle/>
-          <a:p>
-            <a:pPr>
-              <a:defRPr sz="1600"/>
-            </a:pPr>
-            <a:endParaRPr lang="en-US"/>
-          </a:p>
-        </c:txPr>
-        <c:crossAx val="553205064"/>
-        <c:crosses val="autoZero"/>
-        <c:auto val="1"/>
-        <c:lblAlgn val="ctr"/>
-        <c:lblOffset val="100"/>
-        <c:noMultiLvlLbl val="0"/>
-      </c:catAx>
-      <c:valAx>
-        <c:axId val="553205064"/>
-        <c:scaling>
-          <c:orientation val="minMax"/>
-        </c:scaling>
-        <c:delete val="0"/>
-        <c:axPos val="l"/>
-        <c:majorGridlines/>
-        <c:title>
-          <c:tx>
-            <c:rich>
-              <a:bodyPr rot="-5400000" vert="horz"/>
-              <a:lstStyle/>
-              <a:p>
-                <a:pPr>
-                  <a:defRPr sz="1800"/>
-                </a:pPr>
-                <a:r>
-                  <a:rPr lang="en-US" sz="1800" dirty="0" err="1" smtClean="0"/>
-                  <a:t>Avg</a:t>
-                </a:r>
-                <a:r>
-                  <a:rPr lang="en-US" sz="1800" dirty="0" smtClean="0"/>
-                  <a:t> Min </a:t>
-                </a:r>
-                <a:r>
-                  <a:rPr lang="en-US" sz="1800" dirty="0"/>
-                  <a:t>Incarceration Time</a:t>
-                </a:r>
-              </a:p>
-            </c:rich>
-          </c:tx>
-          <c:layout>
-            <c:manualLayout>
-              <c:xMode val="edge"/>
-              <c:yMode val="edge"/>
-              <c:x val="0.0156567780640262"/>
-              <c:y val="0.185849172522076"/>
-            </c:manualLayout>
-          </c:layout>
-          <c:overlay val="0"/>
-        </c:title>
-        <c:numFmt formatCode="General" sourceLinked="1"/>
-        <c:majorTickMark val="out"/>
-        <c:minorTickMark val="none"/>
-        <c:tickLblPos val="nextTo"/>
-        <c:txPr>
-          <a:bodyPr/>
-          <a:lstStyle/>
-          <a:p>
-            <a:pPr>
-              <a:defRPr sz="1800"/>
-            </a:pPr>
-            <a:endParaRPr lang="en-US"/>
-          </a:p>
-        </c:txPr>
-        <c:crossAx val="553199560"/>
-        <c:crosses val="autoZero"/>
-        <c:crossBetween val="between"/>
-      </c:valAx>
-    </c:plotArea>
-    <c:legend>
-      <c:legendPos val="r"/>
-      <c:layout>
-        <c:manualLayout>
-          <c:xMode val="edge"/>
-          <c:yMode val="edge"/>
-          <c:x val="0.697744050248219"/>
-          <c:y val="0.407719426789278"/>
-          <c:w val="0.302255949751781"/>
-          <c:h val="0.178793161174327"/>
-        </c:manualLayout>
-      </c:layout>
-      <c:overlay val="0"/>
-      <c:txPr>
-        <a:bodyPr/>
-        <a:lstStyle/>
-        <a:p>
-          <a:pPr>
-            <a:defRPr sz="1800"/>
-          </a:pPr>
-          <a:endParaRPr lang="en-US"/>
-        </a:p>
-      </c:txPr>
-    </c:legend>
-    <c:plotVisOnly val="1"/>
-    <c:dispBlanksAs val="gap"/>
-    <c:showDLblsOverMax val="0"/>
-  </c:chart>
-  <c:txPr>
-    <a:bodyPr/>
-    <a:lstStyle/>
-    <a:p>
-      <a:pPr>
-        <a:defRPr>
-          <a:latin typeface="Arial"/>
-          <a:cs typeface="Arial"/>
-        </a:defRPr>
-      </a:pPr>
-      <a:endParaRPr lang="en-US"/>
-    </a:p>
-  </c:txPr>
-  <c:externalData r:id="rId1">
-    <c:autoUpdate val="0"/>
-  </c:externalData>
-</c:chartSpace>
-</file>
-
-<file path=ppt/charts/chart2.xml><?xml version="1.0" encoding="utf-8"?>
-<c:chartSpace xmlns:c="http://schemas.openxmlformats.org/drawingml/2006/chart" xmlns:a="http://schemas.openxmlformats.org/drawingml/2006/main" xmlns:r="http://schemas.openxmlformats.org/officeDocument/2006/relationships">
-  <c:date1904 val="0"/>
-  <c:lang val="en-US"/>
-  <c:roundedCorners val="0"/>
-  <mc:AlternateContent xmlns:mc="http://schemas.openxmlformats.org/markup-compatibility/2006">
-    <mc:Choice xmlns:c14="http://schemas.microsoft.com/office/drawing/2007/8/2/chart" Requires="c14">
-      <c14:style val="118"/>
-    </mc:Choice>
-    <mc:Fallback>
-      <c:style val="18"/>
-    </mc:Fallback>
-  </mc:AlternateContent>
-  <c:chart>
-    <c:title>
-      <c:tx>
-        <c:rich>
-          <a:bodyPr/>
-          <a:lstStyle/>
-          <a:p>
-            <a:pPr>
-              <a:defRPr/>
-            </a:pPr>
-            <a:r>
-              <a:rPr lang="en-US"/>
-              <a:t>Crime Count for Each Age Group by Race</a:t>
-            </a:r>
-          </a:p>
-        </c:rich>
-      </c:tx>
-      <c:layout>
-        <c:manualLayout>
-          <c:xMode val="edge"/>
-          <c:yMode val="edge"/>
-          <c:x val="0.102435659084281"/>
-          <c:y val="0.0"/>
-        </c:manualLayout>
-      </c:layout>
-      <c:overlay val="0"/>
-    </c:title>
-    <c:autoTitleDeleted val="0"/>
-    <c:plotArea>
-      <c:layout>
-        <c:manualLayout>
-          <c:layoutTarget val="inner"/>
-          <c:xMode val="edge"/>
-          <c:yMode val="edge"/>
-          <c:x val="0.139667182706398"/>
-          <c:y val="0.162784628839747"/>
-          <c:w val="0.5956985340939"/>
-          <c:h val="0.476787451380793"/>
-        </c:manualLayout>
-      </c:layout>
-      <c:barChart>
-        <c:barDir val="col"/>
-        <c:grouping val="clustered"/>
-        <c:varyColors val="0"/>
-        <c:ser>
-          <c:idx val="0"/>
-          <c:order val="0"/>
-          <c:tx>
-            <c:strRef>
-              <c:f>'Count ppl by AGE &amp; RACE'!$A$5</c:f>
-              <c:strCache>
-                <c:ptCount val="1"/>
-                <c:pt idx="0">
-                  <c:v>Am Indian</c:v>
-                </c:pt>
-              </c:strCache>
-            </c:strRef>
-          </c:tx>
-          <c:invertIfNegative val="0"/>
-          <c:cat>
-            <c:strRef>
-              <c:f>'Count ppl by AGE &amp; RACE'!$B$4:$G$4</c:f>
-              <c:strCache>
-                <c:ptCount val="6"/>
-                <c:pt idx="0">
-                  <c:v>Between 1-18</c:v>
-                </c:pt>
-                <c:pt idx="1">
-                  <c:v>Between 19-24</c:v>
-                </c:pt>
-                <c:pt idx="2">
-                  <c:v>Between 25-35</c:v>
-                </c:pt>
-                <c:pt idx="3">
-                  <c:v>Between 36-50</c:v>
-                </c:pt>
-                <c:pt idx="4">
-                  <c:v>Between 51-69</c:v>
-                </c:pt>
-                <c:pt idx="5">
-                  <c:v>Between 70+</c:v>
-                </c:pt>
-              </c:strCache>
-            </c:strRef>
-          </c:cat>
-          <c:val>
-            <c:numRef>
-              <c:f>'Count ppl by AGE &amp; RACE'!$B$5:$G$5</c:f>
-              <c:numCache>
-                <c:formatCode>General</c:formatCode>
-                <c:ptCount val="6"/>
-                <c:pt idx="0">
-                  <c:v>0.0</c:v>
-                </c:pt>
-                <c:pt idx="1">
-                  <c:v>15.0</c:v>
-                </c:pt>
-                <c:pt idx="2">
-                  <c:v>7.0</c:v>
-                </c:pt>
-                <c:pt idx="3">
-                  <c:v>3.0</c:v>
-                </c:pt>
-                <c:pt idx="4">
-                  <c:v>0.0</c:v>
-                </c:pt>
-                <c:pt idx="5">
-                  <c:v>0.0</c:v>
-                </c:pt>
-              </c:numCache>
-            </c:numRef>
-          </c:val>
-        </c:ser>
-        <c:ser>
-          <c:idx val="1"/>
-          <c:order val="1"/>
-          <c:tx>
-            <c:strRef>
-              <c:f>'Count ppl by AGE &amp; RACE'!$A$6</c:f>
-              <c:strCache>
-                <c:ptCount val="1"/>
-                <c:pt idx="0">
-                  <c:v>Asian</c:v>
-                </c:pt>
-              </c:strCache>
-            </c:strRef>
-          </c:tx>
-          <c:invertIfNegative val="0"/>
-          <c:cat>
-            <c:strRef>
-              <c:f>'Count ppl by AGE &amp; RACE'!$B$4:$G$4</c:f>
-              <c:strCache>
-                <c:ptCount val="6"/>
-                <c:pt idx="0">
-                  <c:v>Between 1-18</c:v>
-                </c:pt>
-                <c:pt idx="1">
-                  <c:v>Between 19-24</c:v>
-                </c:pt>
-                <c:pt idx="2">
-                  <c:v>Between 25-35</c:v>
-                </c:pt>
-                <c:pt idx="3">
-                  <c:v>Between 36-50</c:v>
-                </c:pt>
-                <c:pt idx="4">
-                  <c:v>Between 51-69</c:v>
-                </c:pt>
-                <c:pt idx="5">
-                  <c:v>Between 70+</c:v>
-                </c:pt>
-              </c:strCache>
-            </c:strRef>
-          </c:cat>
-          <c:val>
-            <c:numRef>
-              <c:f>'Count ppl by AGE &amp; RACE'!$B$6:$G$6</c:f>
-              <c:numCache>
-                <c:formatCode>General</c:formatCode>
-                <c:ptCount val="6"/>
-                <c:pt idx="0">
-                  <c:v>3.0</c:v>
-                </c:pt>
-                <c:pt idx="1">
-                  <c:v>46.0</c:v>
-                </c:pt>
-                <c:pt idx="2">
-                  <c:v>33.0</c:v>
-                </c:pt>
-                <c:pt idx="3">
-                  <c:v>12.0</c:v>
-                </c:pt>
-                <c:pt idx="4">
-                  <c:v>1.0</c:v>
-                </c:pt>
-                <c:pt idx="5">
-                  <c:v>0.0</c:v>
-                </c:pt>
-              </c:numCache>
-            </c:numRef>
-          </c:val>
-        </c:ser>
-        <c:ser>
-          <c:idx val="2"/>
-          <c:order val="2"/>
-          <c:tx>
-            <c:strRef>
-              <c:f>'Count ppl by AGE &amp; RACE'!$A$7</c:f>
-              <c:strCache>
-                <c:ptCount val="1"/>
-                <c:pt idx="0">
-                  <c:v>Black</c:v>
-                </c:pt>
-              </c:strCache>
-            </c:strRef>
-          </c:tx>
-          <c:invertIfNegative val="0"/>
-          <c:cat>
-            <c:strRef>
-              <c:f>'Count ppl by AGE &amp; RACE'!$B$4:$G$4</c:f>
-              <c:strCache>
-                <c:ptCount val="6"/>
-                <c:pt idx="0">
-                  <c:v>Between 1-18</c:v>
-                </c:pt>
-                <c:pt idx="1">
-                  <c:v>Between 19-24</c:v>
-                </c:pt>
-                <c:pt idx="2">
-                  <c:v>Between 25-35</c:v>
-                </c:pt>
-                <c:pt idx="3">
-                  <c:v>Between 36-50</c:v>
-                </c:pt>
-                <c:pt idx="4">
-                  <c:v>Between 51-69</c:v>
-                </c:pt>
-                <c:pt idx="5">
-                  <c:v>Between 70+</c:v>
-                </c:pt>
-              </c:strCache>
-            </c:strRef>
-          </c:cat>
-          <c:val>
-            <c:numRef>
-              <c:f>'Count ppl by AGE &amp; RACE'!$B$7:$G$7</c:f>
-              <c:numCache>
-                <c:formatCode>General</c:formatCode>
-                <c:ptCount val="6"/>
-                <c:pt idx="0">
-                  <c:v>353.0</c:v>
-                </c:pt>
-                <c:pt idx="1">
-                  <c:v>2190.0</c:v>
-                </c:pt>
-                <c:pt idx="2">
-                  <c:v>2342.0</c:v>
-                </c:pt>
-                <c:pt idx="3">
-                  <c:v>1598.0</c:v>
-                </c:pt>
-                <c:pt idx="4">
-                  <c:v>167.0</c:v>
-                </c:pt>
-                <c:pt idx="5">
-                  <c:v>10.0</c:v>
-                </c:pt>
-              </c:numCache>
-            </c:numRef>
-          </c:val>
-        </c:ser>
-        <c:ser>
-          <c:idx val="3"/>
-          <c:order val="3"/>
-          <c:tx>
-            <c:strRef>
-              <c:f>'Count ppl by AGE &amp; RACE'!$A$8</c:f>
-              <c:strCache>
-                <c:ptCount val="1"/>
-                <c:pt idx="0">
-                  <c:v>Hispanic</c:v>
-                </c:pt>
-              </c:strCache>
-            </c:strRef>
-          </c:tx>
-          <c:invertIfNegative val="0"/>
-          <c:cat>
-            <c:strRef>
-              <c:f>'Count ppl by AGE &amp; RACE'!$B$4:$G$4</c:f>
-              <c:strCache>
-                <c:ptCount val="6"/>
-                <c:pt idx="0">
-                  <c:v>Between 1-18</c:v>
-                </c:pt>
-                <c:pt idx="1">
-                  <c:v>Between 19-24</c:v>
-                </c:pt>
-                <c:pt idx="2">
-                  <c:v>Between 25-35</c:v>
-                </c:pt>
-                <c:pt idx="3">
-                  <c:v>Between 36-50</c:v>
-                </c:pt>
-                <c:pt idx="4">
-                  <c:v>Between 51-69</c:v>
-                </c:pt>
-                <c:pt idx="5">
-                  <c:v>Between 70+</c:v>
-                </c:pt>
-              </c:strCache>
-            </c:strRef>
-          </c:cat>
-          <c:val>
-            <c:numRef>
-              <c:f>'Count ppl by AGE &amp; RACE'!$B$8:$G$8</c:f>
-              <c:numCache>
-                <c:formatCode>General</c:formatCode>
-                <c:ptCount val="6"/>
-                <c:pt idx="0">
-                  <c:v>94.0</c:v>
-                </c:pt>
-                <c:pt idx="1">
-                  <c:v>590.0</c:v>
-                </c:pt>
-                <c:pt idx="2">
-                  <c:v>551.0</c:v>
-                </c:pt>
-                <c:pt idx="3">
-                  <c:v>253.0</c:v>
-                </c:pt>
-                <c:pt idx="4">
-                  <c:v>36.0</c:v>
-                </c:pt>
-                <c:pt idx="5">
-                  <c:v>2.0</c:v>
-                </c:pt>
-              </c:numCache>
-            </c:numRef>
-          </c:val>
-        </c:ser>
-        <c:ser>
-          <c:idx val="4"/>
-          <c:order val="4"/>
-          <c:tx>
-            <c:strRef>
-              <c:f>'Count ppl by AGE &amp; RACE'!$A$9</c:f>
-              <c:strCache>
-                <c:ptCount val="1"/>
-                <c:pt idx="0">
-                  <c:v>Other</c:v>
-                </c:pt>
-              </c:strCache>
-            </c:strRef>
-          </c:tx>
-          <c:invertIfNegative val="0"/>
-          <c:cat>
-            <c:strRef>
-              <c:f>'Count ppl by AGE &amp; RACE'!$B$4:$G$4</c:f>
-              <c:strCache>
-                <c:ptCount val="6"/>
-                <c:pt idx="0">
-                  <c:v>Between 1-18</c:v>
-                </c:pt>
-                <c:pt idx="1">
-                  <c:v>Between 19-24</c:v>
-                </c:pt>
-                <c:pt idx="2">
-                  <c:v>Between 25-35</c:v>
-                </c:pt>
-                <c:pt idx="3">
-                  <c:v>Between 36-50</c:v>
-                </c:pt>
-                <c:pt idx="4">
-                  <c:v>Between 51-69</c:v>
-                </c:pt>
-                <c:pt idx="5">
-                  <c:v>Between 70+</c:v>
-                </c:pt>
-              </c:strCache>
-            </c:strRef>
-          </c:cat>
-          <c:val>
-            <c:numRef>
-              <c:f>'Count ppl by AGE &amp; RACE'!$B$9:$G$9</c:f>
-              <c:numCache>
-                <c:formatCode>General</c:formatCode>
-                <c:ptCount val="6"/>
-                <c:pt idx="0">
-                  <c:v>3.0</c:v>
-                </c:pt>
-                <c:pt idx="1">
-                  <c:v>22.0</c:v>
-                </c:pt>
-                <c:pt idx="2">
-                  <c:v>17.0</c:v>
-                </c:pt>
-                <c:pt idx="3">
-                  <c:v>7.0</c:v>
-                </c:pt>
-                <c:pt idx="4">
-                  <c:v>0.0</c:v>
-                </c:pt>
-                <c:pt idx="5">
-                  <c:v>0.0</c:v>
-                </c:pt>
-              </c:numCache>
-            </c:numRef>
-          </c:val>
-        </c:ser>
-        <c:ser>
-          <c:idx val="5"/>
-          <c:order val="5"/>
-          <c:tx>
-            <c:strRef>
-              <c:f>'Count ppl by AGE &amp; RACE'!$A$10</c:f>
-              <c:strCache>
-                <c:ptCount val="1"/>
-                <c:pt idx="0">
-                  <c:v>Unknown</c:v>
-                </c:pt>
-              </c:strCache>
-            </c:strRef>
-          </c:tx>
-          <c:invertIfNegative val="0"/>
-          <c:cat>
-            <c:strRef>
-              <c:f>'Count ppl by AGE &amp; RACE'!$B$4:$G$4</c:f>
-              <c:strCache>
-                <c:ptCount val="6"/>
-                <c:pt idx="0">
-                  <c:v>Between 1-18</c:v>
-                </c:pt>
-                <c:pt idx="1">
-                  <c:v>Between 19-24</c:v>
-                </c:pt>
-                <c:pt idx="2">
-                  <c:v>Between 25-35</c:v>
-                </c:pt>
-                <c:pt idx="3">
-                  <c:v>Between 36-50</c:v>
-                </c:pt>
-                <c:pt idx="4">
-                  <c:v>Between 51-69</c:v>
-                </c:pt>
-                <c:pt idx="5">
-                  <c:v>Between 70+</c:v>
-                </c:pt>
-              </c:strCache>
-            </c:strRef>
-          </c:cat>
-          <c:val>
-            <c:numRef>
-              <c:f>'Count ppl by AGE &amp; RACE'!$B$10:$G$10</c:f>
-              <c:numCache>
-                <c:formatCode>General</c:formatCode>
-                <c:ptCount val="6"/>
-                <c:pt idx="0">
-                  <c:v>22.0</c:v>
-                </c:pt>
-                <c:pt idx="1">
-                  <c:v>179.0</c:v>
-                </c:pt>
-                <c:pt idx="2">
-                  <c:v>228.0</c:v>
-                </c:pt>
-                <c:pt idx="3">
-                  <c:v>166.0</c:v>
-                </c:pt>
-                <c:pt idx="4">
-                  <c:v>24.0</c:v>
-                </c:pt>
-                <c:pt idx="5">
-                  <c:v>2.0</c:v>
-                </c:pt>
-              </c:numCache>
-            </c:numRef>
-          </c:val>
-        </c:ser>
-        <c:ser>
-          <c:idx val="6"/>
-          <c:order val="6"/>
-          <c:tx>
-            <c:strRef>
-              <c:f>'Count ppl by AGE &amp; RACE'!$A$11</c:f>
-              <c:strCache>
-                <c:ptCount val="1"/>
-                <c:pt idx="0">
-                  <c:v>White</c:v>
-                </c:pt>
-              </c:strCache>
-            </c:strRef>
-          </c:tx>
-          <c:invertIfNegative val="0"/>
-          <c:cat>
-            <c:strRef>
-              <c:f>'Count ppl by AGE &amp; RACE'!$B$4:$G$4</c:f>
-              <c:strCache>
-                <c:ptCount val="6"/>
-                <c:pt idx="0">
-                  <c:v>Between 1-18</c:v>
-                </c:pt>
-                <c:pt idx="1">
-                  <c:v>Between 19-24</c:v>
-                </c:pt>
-                <c:pt idx="2">
-                  <c:v>Between 25-35</c:v>
-                </c:pt>
-                <c:pt idx="3">
-                  <c:v>Between 36-50</c:v>
-                </c:pt>
-                <c:pt idx="4">
-                  <c:v>Between 51-69</c:v>
-                </c:pt>
-                <c:pt idx="5">
-                  <c:v>Between 70+</c:v>
-                </c:pt>
-              </c:strCache>
-            </c:strRef>
-          </c:cat>
-          <c:val>
-            <c:numRef>
-              <c:f>'Count ppl by AGE &amp; RACE'!$B$11:$G$11</c:f>
-              <c:numCache>
-                <c:formatCode>General</c:formatCode>
-                <c:ptCount val="6"/>
-                <c:pt idx="0">
-                  <c:v>505.0</c:v>
-                </c:pt>
-                <c:pt idx="1">
-                  <c:v>3863.0</c:v>
-                </c:pt>
-                <c:pt idx="2">
-                  <c:v>5334.0</c:v>
-                </c:pt>
-                <c:pt idx="3">
-                  <c:v>4483.0</c:v>
-                </c:pt>
-                <c:pt idx="4">
-                  <c:v>700.0</c:v>
-                </c:pt>
-                <c:pt idx="5">
-                  <c:v>27.0</c:v>
-                </c:pt>
-              </c:numCache>
-            </c:numRef>
-          </c:val>
-        </c:ser>
-        <c:dLbls>
-          <c:showLegendKey val="0"/>
-          <c:showVal val="0"/>
-          <c:showCatName val="0"/>
-          <c:showSerName val="0"/>
-          <c:showPercent val="0"/>
-          <c:showBubbleSize val="0"/>
-        </c:dLbls>
-        <c:gapWidth val="150"/>
-        <c:axId val="476459432"/>
-        <c:axId val="493253736"/>
-      </c:barChart>
-      <c:catAx>
-        <c:axId val="476459432"/>
-        <c:scaling>
-          <c:orientation val="minMax"/>
-        </c:scaling>
-        <c:delete val="0"/>
-        <c:axPos val="b"/>
-        <c:title>
-          <c:tx>
-            <c:rich>
-              <a:bodyPr/>
-              <a:lstStyle/>
-              <a:p>
-                <a:pPr>
-                  <a:defRPr sz="1800"/>
-                </a:pPr>
-                <a:r>
-                  <a:rPr lang="en-US" sz="1800"/>
-                  <a:t>Age</a:t>
-                </a:r>
-              </a:p>
-            </c:rich>
-          </c:tx>
-          <c:layout>
-            <c:manualLayout>
-              <c:xMode val="edge"/>
-              <c:yMode val="edge"/>
-              <c:x val="0.402949869724523"/>
-              <c:y val="0.805089566982064"/>
-            </c:manualLayout>
-          </c:layout>
-          <c:overlay val="0"/>
-        </c:title>
-        <c:majorTickMark val="out"/>
-        <c:minorTickMark val="none"/>
-        <c:tickLblPos val="nextTo"/>
-        <c:txPr>
-          <a:bodyPr/>
-          <a:lstStyle/>
-          <a:p>
-            <a:pPr>
-              <a:defRPr sz="1400"/>
-            </a:pPr>
-            <a:endParaRPr lang="en-US"/>
-          </a:p>
-        </c:txPr>
-        <c:crossAx val="493253736"/>
-        <c:crosses val="autoZero"/>
-        <c:auto val="1"/>
-        <c:lblAlgn val="ctr"/>
-        <c:lblOffset val="100"/>
-        <c:noMultiLvlLbl val="0"/>
-      </c:catAx>
-      <c:valAx>
-        <c:axId val="493253736"/>
-        <c:scaling>
-          <c:orientation val="minMax"/>
-        </c:scaling>
-        <c:delete val="0"/>
-        <c:axPos val="l"/>
-        <c:majorGridlines/>
-        <c:title>
-          <c:tx>
-            <c:rich>
-              <a:bodyPr rot="-5400000" vert="horz"/>
-              <a:lstStyle/>
-              <a:p>
-                <a:pPr>
-                  <a:defRPr sz="1800"/>
-                </a:pPr>
-                <a:r>
-                  <a:rPr lang="en-US" sz="1800"/>
-                  <a:t>Crime Count</a:t>
-                </a:r>
-              </a:p>
-            </c:rich>
-          </c:tx>
-          <c:layout/>
-          <c:overlay val="0"/>
-        </c:title>
-        <c:numFmt formatCode="General" sourceLinked="1"/>
-        <c:majorTickMark val="out"/>
-        <c:minorTickMark val="none"/>
-        <c:tickLblPos val="nextTo"/>
-        <c:txPr>
-          <a:bodyPr/>
-          <a:lstStyle/>
-          <a:p>
-            <a:pPr>
-              <a:defRPr sz="1800"/>
-            </a:pPr>
-            <a:endParaRPr lang="en-US"/>
-          </a:p>
-        </c:txPr>
-        <c:crossAx val="476459432"/>
-        <c:crosses val="autoZero"/>
-        <c:crossBetween val="between"/>
-      </c:valAx>
-    </c:plotArea>
-    <c:legend>
-      <c:legendPos val="r"/>
-      <c:layout>
-        <c:manualLayout>
-          <c:xMode val="edge"/>
-          <c:yMode val="edge"/>
-          <c:x val="0.764070346490835"/>
-          <c:y val="0.056622918618441"/>
-          <c:w val="0.194549198117324"/>
-          <c:h val="0.701993144849722"/>
-        </c:manualLayout>
-      </c:layout>
-      <c:overlay val="0"/>
-      <c:txPr>
-        <a:bodyPr/>
-        <a:lstStyle/>
-        <a:p>
-          <a:pPr>
-            <a:defRPr sz="1800"/>
-          </a:pPr>
-          <a:endParaRPr lang="en-US"/>
-        </a:p>
-      </c:txPr>
-    </c:legend>
-    <c:plotVisOnly val="1"/>
-    <c:dispBlanksAs val="gap"/>
-    <c:showDLblsOverMax val="0"/>
-  </c:chart>
-  <c:txPr>
-    <a:bodyPr/>
-    <a:lstStyle/>
-    <a:p>
-      <a:pPr>
-        <a:defRPr>
-          <a:latin typeface="Arial"/>
-          <a:cs typeface="Arial"/>
-        </a:defRPr>
-      </a:pPr>
-      <a:endParaRPr lang="en-US"/>
-    </a:p>
-  </c:txPr>
-  <c:externalData r:id="rId1">
-    <c:autoUpdate val="0"/>
-  </c:externalData>
-</c:chartSpace>
-</file>
-
-<file path=ppt/charts/chart3.xml><?xml version="1.0" encoding="utf-8"?>
-<c:chartSpace xmlns:c="http://schemas.openxmlformats.org/drawingml/2006/chart" xmlns:a="http://schemas.openxmlformats.org/drawingml/2006/main" xmlns:r="http://schemas.openxmlformats.org/officeDocument/2006/relationships">
-  <c:date1904 val="0"/>
-  <c:lang val="en-US"/>
-  <c:roundedCorners val="0"/>
-  <mc:AlternateContent xmlns:mc="http://schemas.openxmlformats.org/markup-compatibility/2006">
-    <mc:Choice xmlns:c14="http://schemas.microsoft.com/office/drawing/2007/8/2/chart" Requires="c14">
-      <c14:style val="118"/>
-    </mc:Choice>
-    <mc:Fallback>
-      <c:style val="18"/>
-    </mc:Fallback>
-  </mc:AlternateContent>
-  <c:chart>
-    <c:title>
-      <c:tx>
-        <c:rich>
-          <a:bodyPr/>
-          <a:lstStyle/>
-          <a:p>
-            <a:pPr>
-              <a:defRPr/>
-            </a:pPr>
-            <a:r>
-              <a:rPr lang="en-US"/>
-              <a:t>Avg Min Incarceration Time for Each Age Group by Race</a:t>
-            </a:r>
-          </a:p>
-        </c:rich>
-      </c:tx>
-      <c:layout/>
-      <c:overlay val="0"/>
-    </c:title>
-    <c:autoTitleDeleted val="0"/>
-    <c:plotArea>
-      <c:layout/>
-      <c:barChart>
-        <c:barDir val="col"/>
-        <c:grouping val="clustered"/>
-        <c:varyColors val="0"/>
-        <c:ser>
-          <c:idx val="0"/>
-          <c:order val="0"/>
-          <c:tx>
-            <c:strRef>
-              <c:f>'Count ppl by AGE &amp; RACE'!$A$23</c:f>
-              <c:strCache>
-                <c:ptCount val="1"/>
-                <c:pt idx="0">
-                  <c:v>Am Indian</c:v>
-                </c:pt>
-              </c:strCache>
-            </c:strRef>
-          </c:tx>
-          <c:invertIfNegative val="0"/>
-          <c:cat>
-            <c:strRef>
-              <c:f>'Count ppl by AGE &amp; RACE'!$B$22:$G$22</c:f>
-              <c:strCache>
-                <c:ptCount val="6"/>
-                <c:pt idx="0">
-                  <c:v>Between 1-18</c:v>
-                </c:pt>
-                <c:pt idx="1">
-                  <c:v>Between 19-24</c:v>
-                </c:pt>
-                <c:pt idx="2">
-                  <c:v>Between 25-35</c:v>
-                </c:pt>
-                <c:pt idx="3">
-                  <c:v>Between 36-50</c:v>
-                </c:pt>
-                <c:pt idx="4">
-                  <c:v>Between 51-69</c:v>
-                </c:pt>
-                <c:pt idx="5">
-                  <c:v>Between 70+</c:v>
-                </c:pt>
-              </c:strCache>
-            </c:strRef>
-          </c:cat>
-          <c:val>
-            <c:numRef>
-              <c:f>'Count ppl by AGE &amp; RACE'!$B$23:$G$23</c:f>
-              <c:numCache>
-                <c:formatCode>General</c:formatCode>
-                <c:ptCount val="6"/>
-                <c:pt idx="1">
-                  <c:v>3.96</c:v>
-                </c:pt>
-                <c:pt idx="2">
-                  <c:v>3.345714285714285</c:v>
-                </c:pt>
-                <c:pt idx="3">
-                  <c:v>26.0</c:v>
-                </c:pt>
-              </c:numCache>
-            </c:numRef>
-          </c:val>
-        </c:ser>
-        <c:ser>
-          <c:idx val="1"/>
-          <c:order val="1"/>
-          <c:tx>
-            <c:strRef>
-              <c:f>'Count ppl by AGE &amp; RACE'!$A$24</c:f>
-              <c:strCache>
-                <c:ptCount val="1"/>
-                <c:pt idx="0">
-                  <c:v>Asian</c:v>
-                </c:pt>
-              </c:strCache>
-            </c:strRef>
-          </c:tx>
-          <c:invertIfNegative val="0"/>
-          <c:cat>
-            <c:strRef>
-              <c:f>'Count ppl by AGE &amp; RACE'!$B$22:$G$22</c:f>
-              <c:strCache>
-                <c:ptCount val="6"/>
-                <c:pt idx="0">
-                  <c:v>Between 1-18</c:v>
-                </c:pt>
-                <c:pt idx="1">
-                  <c:v>Between 19-24</c:v>
-                </c:pt>
-                <c:pt idx="2">
-                  <c:v>Between 25-35</c:v>
-                </c:pt>
-                <c:pt idx="3">
-                  <c:v>Between 36-50</c:v>
-                </c:pt>
-                <c:pt idx="4">
-                  <c:v>Between 51-69</c:v>
-                </c:pt>
-                <c:pt idx="5">
-                  <c:v>Between 70+</c:v>
-                </c:pt>
-              </c:strCache>
-            </c:strRef>
-          </c:cat>
-          <c:val>
-            <c:numRef>
-              <c:f>'Count ppl by AGE &amp; RACE'!$B$24:$G$24</c:f>
-              <c:numCache>
-                <c:formatCode>General</c:formatCode>
-                <c:ptCount val="6"/>
-                <c:pt idx="0">
-                  <c:v>25.0</c:v>
-                </c:pt>
-                <c:pt idx="1">
-                  <c:v>16.56282608695652</c:v>
-                </c:pt>
-                <c:pt idx="2">
-                  <c:v>30.08000000000001</c:v>
-                </c:pt>
-                <c:pt idx="3">
-                  <c:v>85.81916666666667</c:v>
-                </c:pt>
-                <c:pt idx="4">
-                  <c:v>1.0</c:v>
-                </c:pt>
-              </c:numCache>
-            </c:numRef>
-          </c:val>
-        </c:ser>
-        <c:ser>
-          <c:idx val="2"/>
-          <c:order val="2"/>
-          <c:tx>
-            <c:strRef>
-              <c:f>'Count ppl by AGE &amp; RACE'!$A$25</c:f>
-              <c:strCache>
-                <c:ptCount val="1"/>
-                <c:pt idx="0">
-                  <c:v>Black</c:v>
-                </c:pt>
-              </c:strCache>
-            </c:strRef>
-          </c:tx>
-          <c:invertIfNegative val="0"/>
-          <c:cat>
-            <c:strRef>
-              <c:f>'Count ppl by AGE &amp; RACE'!$B$22:$G$22</c:f>
-              <c:strCache>
-                <c:ptCount val="6"/>
-                <c:pt idx="0">
-                  <c:v>Between 1-18</c:v>
-                </c:pt>
-                <c:pt idx="1">
-                  <c:v>Between 19-24</c:v>
-                </c:pt>
-                <c:pt idx="2">
-                  <c:v>Between 25-35</c:v>
-                </c:pt>
-                <c:pt idx="3">
-                  <c:v>Between 36-50</c:v>
-                </c:pt>
-                <c:pt idx="4">
-                  <c:v>Between 51-69</c:v>
-                </c:pt>
-                <c:pt idx="5">
-                  <c:v>Between 70+</c:v>
-                </c:pt>
-              </c:strCache>
-            </c:strRef>
-          </c:cat>
-          <c:val>
-            <c:numRef>
-              <c:f>'Count ppl by AGE &amp; RACE'!$B$25:$G$25</c:f>
-              <c:numCache>
-                <c:formatCode>General</c:formatCode>
-                <c:ptCount val="6"/>
-                <c:pt idx="0">
-                  <c:v>22.19456090651558</c:v>
-                </c:pt>
-                <c:pt idx="1">
-                  <c:v>26.98887214611872</c:v>
-                </c:pt>
-                <c:pt idx="2">
-                  <c:v>25.10267292912038</c:v>
-                </c:pt>
-                <c:pt idx="3">
-                  <c:v>21.95054443053816</c:v>
-                </c:pt>
-                <c:pt idx="4">
-                  <c:v>13.26257485029941</c:v>
-                </c:pt>
-                <c:pt idx="5">
-                  <c:v>5.752000000000001</c:v>
-                </c:pt>
-              </c:numCache>
-            </c:numRef>
-          </c:val>
-        </c:ser>
-        <c:ser>
-          <c:idx val="3"/>
-          <c:order val="3"/>
-          <c:tx>
-            <c:strRef>
-              <c:f>'Count ppl by AGE &amp; RACE'!$A$26</c:f>
-              <c:strCache>
-                <c:ptCount val="1"/>
-                <c:pt idx="0">
-                  <c:v>Hispanic</c:v>
-                </c:pt>
-              </c:strCache>
-            </c:strRef>
-          </c:tx>
-          <c:invertIfNegative val="0"/>
-          <c:cat>
-            <c:strRef>
-              <c:f>'Count ppl by AGE &amp; RACE'!$B$22:$G$22</c:f>
-              <c:strCache>
-                <c:ptCount val="6"/>
-                <c:pt idx="0">
-                  <c:v>Between 1-18</c:v>
-                </c:pt>
-                <c:pt idx="1">
-                  <c:v>Between 19-24</c:v>
-                </c:pt>
-                <c:pt idx="2">
-                  <c:v>Between 25-35</c:v>
-                </c:pt>
-                <c:pt idx="3">
-                  <c:v>Between 36-50</c:v>
-                </c:pt>
-                <c:pt idx="4">
-                  <c:v>Between 51-69</c:v>
-                </c:pt>
-                <c:pt idx="5">
-                  <c:v>Between 70+</c:v>
-                </c:pt>
-              </c:strCache>
-            </c:strRef>
-          </c:cat>
-          <c:val>
-            <c:numRef>
-              <c:f>'Count ppl by AGE &amp; RACE'!$B$26:$G$26</c:f>
-              <c:numCache>
-                <c:formatCode>General</c:formatCode>
-                <c:ptCount val="6"/>
-                <c:pt idx="0">
-                  <c:v>15.69670212765958</c:v>
-                </c:pt>
-                <c:pt idx="1">
-                  <c:v>33.35869491525418</c:v>
-                </c:pt>
-                <c:pt idx="2">
-                  <c:v>28.20528130671508</c:v>
-                </c:pt>
-                <c:pt idx="3">
-                  <c:v>13.46600790513834</c:v>
-                </c:pt>
-                <c:pt idx="4">
-                  <c:v>35.77166666666654</c:v>
-                </c:pt>
-                <c:pt idx="5">
-                  <c:v>6.035</c:v>
-                </c:pt>
-              </c:numCache>
-            </c:numRef>
-          </c:val>
-        </c:ser>
-        <c:ser>
-          <c:idx val="4"/>
-          <c:order val="4"/>
-          <c:tx>
-            <c:strRef>
-              <c:f>'Count ppl by AGE &amp; RACE'!$A$27</c:f>
-              <c:strCache>
-                <c:ptCount val="1"/>
-                <c:pt idx="0">
-                  <c:v>Other</c:v>
-                </c:pt>
-              </c:strCache>
-            </c:strRef>
-          </c:tx>
-          <c:invertIfNegative val="0"/>
-          <c:cat>
-            <c:strRef>
-              <c:f>'Count ppl by AGE &amp; RACE'!$B$22:$G$22</c:f>
-              <c:strCache>
-                <c:ptCount val="6"/>
-                <c:pt idx="0">
-                  <c:v>Between 1-18</c:v>
-                </c:pt>
-                <c:pt idx="1">
-                  <c:v>Between 19-24</c:v>
-                </c:pt>
-                <c:pt idx="2">
-                  <c:v>Between 25-35</c:v>
-                </c:pt>
-                <c:pt idx="3">
-                  <c:v>Between 36-50</c:v>
-                </c:pt>
-                <c:pt idx="4">
-                  <c:v>Between 51-69</c:v>
-                </c:pt>
-                <c:pt idx="5">
-                  <c:v>Between 70+</c:v>
-                </c:pt>
-              </c:strCache>
-            </c:strRef>
-          </c:cat>
-          <c:val>
-            <c:numRef>
-              <c:f>'Count ppl by AGE &amp; RACE'!$B$27:$G$27</c:f>
-              <c:numCache>
-                <c:formatCode>General</c:formatCode>
-                <c:ptCount val="6"/>
-                <c:pt idx="0">
-                  <c:v>5.57333333333334</c:v>
-                </c:pt>
-                <c:pt idx="1">
-                  <c:v>7.265</c:v>
-                </c:pt>
-                <c:pt idx="2">
-                  <c:v>13.21352941176471</c:v>
-                </c:pt>
-                <c:pt idx="3">
-                  <c:v>2.595714285714286</c:v>
-                </c:pt>
-              </c:numCache>
-            </c:numRef>
-          </c:val>
-        </c:ser>
-        <c:ser>
-          <c:idx val="5"/>
-          <c:order val="5"/>
-          <c:tx>
-            <c:strRef>
-              <c:f>'Count ppl by AGE &amp; RACE'!$A$28</c:f>
-              <c:strCache>
-                <c:ptCount val="1"/>
-                <c:pt idx="0">
-                  <c:v>Unknown</c:v>
-                </c:pt>
-              </c:strCache>
-            </c:strRef>
-          </c:tx>
-          <c:invertIfNegative val="0"/>
-          <c:cat>
-            <c:strRef>
-              <c:f>'Count ppl by AGE &amp; RACE'!$B$22:$G$22</c:f>
-              <c:strCache>
-                <c:ptCount val="6"/>
-                <c:pt idx="0">
-                  <c:v>Between 1-18</c:v>
-                </c:pt>
-                <c:pt idx="1">
-                  <c:v>Between 19-24</c:v>
-                </c:pt>
-                <c:pt idx="2">
-                  <c:v>Between 25-35</c:v>
-                </c:pt>
-                <c:pt idx="3">
-                  <c:v>Between 36-50</c:v>
-                </c:pt>
-                <c:pt idx="4">
-                  <c:v>Between 51-69</c:v>
-                </c:pt>
-                <c:pt idx="5">
-                  <c:v>Between 70+</c:v>
-                </c:pt>
-              </c:strCache>
-            </c:strRef>
-          </c:cat>
-          <c:val>
-            <c:numRef>
-              <c:f>'Count ppl by AGE &amp; RACE'!$B$28:$G$28</c:f>
-              <c:numCache>
-                <c:formatCode>General</c:formatCode>
-                <c:ptCount val="6"/>
-                <c:pt idx="0">
-                  <c:v>6.33136363636364</c:v>
-                </c:pt>
-                <c:pt idx="1">
-                  <c:v>23.75435754189944</c:v>
-                </c:pt>
-                <c:pt idx="2">
-                  <c:v>11.67728070175439</c:v>
-                </c:pt>
-                <c:pt idx="3">
-                  <c:v>18.16885542168675</c:v>
-                </c:pt>
-                <c:pt idx="4">
-                  <c:v>1.183333333333333</c:v>
-                </c:pt>
-                <c:pt idx="5">
-                  <c:v>1.125</c:v>
-                </c:pt>
-              </c:numCache>
-            </c:numRef>
-          </c:val>
-        </c:ser>
-        <c:ser>
-          <c:idx val="6"/>
-          <c:order val="6"/>
-          <c:tx>
-            <c:strRef>
-              <c:f>'Count ppl by AGE &amp; RACE'!$A$29</c:f>
-              <c:strCache>
-                <c:ptCount val="1"/>
-                <c:pt idx="0">
-                  <c:v>White</c:v>
-                </c:pt>
-              </c:strCache>
-            </c:strRef>
-          </c:tx>
-          <c:invertIfNegative val="0"/>
-          <c:cat>
-            <c:strRef>
-              <c:f>'Count ppl by AGE &amp; RACE'!$B$22:$G$22</c:f>
-              <c:strCache>
-                <c:ptCount val="6"/>
-                <c:pt idx="0">
-                  <c:v>Between 1-18</c:v>
-                </c:pt>
-                <c:pt idx="1">
-                  <c:v>Between 19-24</c:v>
-                </c:pt>
-                <c:pt idx="2">
-                  <c:v>Between 25-35</c:v>
-                </c:pt>
-                <c:pt idx="3">
-                  <c:v>Between 36-50</c:v>
-                </c:pt>
-                <c:pt idx="4">
-                  <c:v>Between 51-69</c:v>
-                </c:pt>
-                <c:pt idx="5">
-                  <c:v>Between 70+</c:v>
-                </c:pt>
-              </c:strCache>
-            </c:strRef>
-          </c:cat>
-          <c:val>
-            <c:numRef>
-              <c:f>'Count ppl by AGE &amp; RACE'!$B$29:$G$29</c:f>
-              <c:numCache>
-                <c:formatCode>General</c:formatCode>
-                <c:ptCount val="6"/>
-                <c:pt idx="0">
-                  <c:v>18.70742574257425</c:v>
-                </c:pt>
-                <c:pt idx="1">
-                  <c:v>15.92442143411856</c:v>
-                </c:pt>
-                <c:pt idx="2">
-                  <c:v>9.531085489313767</c:v>
-                </c:pt>
-                <c:pt idx="3">
-                  <c:v>9.513943787642161</c:v>
-                </c:pt>
-                <c:pt idx="4">
-                  <c:v>9.919342857142822</c:v>
-                </c:pt>
-                <c:pt idx="5">
-                  <c:v>4.582962962962962</c:v>
-                </c:pt>
-              </c:numCache>
-            </c:numRef>
-          </c:val>
-        </c:ser>
-        <c:dLbls>
-          <c:showLegendKey val="0"/>
-          <c:showVal val="0"/>
-          <c:showCatName val="0"/>
-          <c:showSerName val="0"/>
-          <c:showPercent val="0"/>
-          <c:showBubbleSize val="0"/>
-        </c:dLbls>
-        <c:gapWidth val="150"/>
-        <c:axId val="476968488"/>
-        <c:axId val="529608968"/>
-      </c:barChart>
-      <c:catAx>
-        <c:axId val="476968488"/>
-        <c:scaling>
-          <c:orientation val="minMax"/>
-        </c:scaling>
-        <c:delete val="0"/>
-        <c:axPos val="b"/>
-        <c:title>
-          <c:tx>
-            <c:rich>
-              <a:bodyPr/>
-              <a:lstStyle/>
-              <a:p>
-                <a:pPr>
-                  <a:defRPr sz="1800"/>
-                </a:pPr>
-                <a:r>
-                  <a:rPr lang="en-US" sz="1800"/>
-                  <a:t>Age</a:t>
-                </a:r>
-              </a:p>
-            </c:rich>
-          </c:tx>
-          <c:layout/>
-          <c:overlay val="0"/>
-        </c:title>
-        <c:majorTickMark val="out"/>
-        <c:minorTickMark val="none"/>
-        <c:tickLblPos val="nextTo"/>
-        <c:txPr>
-          <a:bodyPr/>
-          <a:lstStyle/>
-          <a:p>
-            <a:pPr>
-              <a:defRPr sz="1200"/>
-            </a:pPr>
-            <a:endParaRPr lang="en-US"/>
-          </a:p>
-        </c:txPr>
-        <c:crossAx val="529608968"/>
-        <c:crosses val="autoZero"/>
-        <c:auto val="1"/>
-        <c:lblAlgn val="ctr"/>
-        <c:lblOffset val="100"/>
-        <c:noMultiLvlLbl val="0"/>
-      </c:catAx>
-      <c:valAx>
-        <c:axId val="529608968"/>
-        <c:scaling>
-          <c:orientation val="minMax"/>
-        </c:scaling>
-        <c:delete val="0"/>
-        <c:axPos val="l"/>
-        <c:majorGridlines/>
-        <c:title>
-          <c:tx>
-            <c:rich>
-              <a:bodyPr rot="-5400000" vert="horz"/>
-              <a:lstStyle/>
-              <a:p>
-                <a:pPr>
-                  <a:defRPr/>
-                </a:pPr>
-                <a:r>
-                  <a:rPr lang="en-US"/>
-                  <a:t>Avg Incarceration Time</a:t>
-                </a:r>
-              </a:p>
-            </c:rich>
-          </c:tx>
-          <c:layout/>
-          <c:overlay val="0"/>
-        </c:title>
-        <c:numFmt formatCode="General" sourceLinked="1"/>
-        <c:majorTickMark val="out"/>
-        <c:minorTickMark val="none"/>
-        <c:tickLblPos val="nextTo"/>
-        <c:crossAx val="476968488"/>
-        <c:crosses val="autoZero"/>
-        <c:crossBetween val="between"/>
-      </c:valAx>
-    </c:plotArea>
-    <c:legend>
-      <c:legendPos val="r"/>
-      <c:layout/>
-      <c:overlay val="0"/>
-      <c:txPr>
-        <a:bodyPr/>
-        <a:lstStyle/>
-        <a:p>
-          <a:pPr>
-            <a:defRPr sz="1800"/>
-          </a:pPr>
-          <a:endParaRPr lang="en-US"/>
-        </a:p>
-      </c:txPr>
-    </c:legend>
-    <c:plotVisOnly val="1"/>
-    <c:dispBlanksAs val="gap"/>
-    <c:showDLblsOverMax val="0"/>
-  </c:chart>
-  <c:txPr>
-    <a:bodyPr/>
-    <a:lstStyle/>
-    <a:p>
-      <a:pPr>
-        <a:defRPr>
-          <a:latin typeface="Arial"/>
-          <a:cs typeface="Arial"/>
-        </a:defRPr>
-      </a:pPr>
-      <a:endParaRPr lang="en-US"/>
-    </a:p>
-  </c:txPr>
-  <c:externalData r:id="rId1">
-    <c:autoUpdate val="0"/>
-  </c:externalData>
-</c:chartSpace>
-</file>
-
-<file path=ppt/charts/chart4.xml><?xml version="1.0" encoding="utf-8"?>
-<c:chartSpace xmlns:c="http://schemas.openxmlformats.org/drawingml/2006/chart" xmlns:a="http://schemas.openxmlformats.org/drawingml/2006/main" xmlns:r="http://schemas.openxmlformats.org/officeDocument/2006/relationships">
-  <c:date1904 val="0"/>
-  <c:lang val="en-US"/>
-  <c:roundedCorners val="0"/>
-  <mc:AlternateContent xmlns:mc="http://schemas.openxmlformats.org/markup-compatibility/2006">
-    <mc:Choice xmlns:c14="http://schemas.microsoft.com/office/drawing/2007/8/2/chart" Requires="c14">
-      <c14:style val="118"/>
-    </mc:Choice>
-    <mc:Fallback>
-      <c:style val="18"/>
-    </mc:Fallback>
-  </mc:AlternateContent>
-  <c:chart>
-    <c:title>
-      <c:tx>
-        <c:rich>
-          <a:bodyPr/>
-          <a:lstStyle/>
-          <a:p>
-            <a:pPr>
-              <a:defRPr/>
-            </a:pPr>
-            <a:r>
-              <a:rPr lang="en-US" dirty="0"/>
-              <a:t>Population Normalized Total Minimum Incarceration Times (Misdemeanor + Felony)</a:t>
-            </a:r>
-          </a:p>
-        </c:rich>
-      </c:tx>
-      <c:layout/>
-      <c:overlay val="0"/>
-    </c:title>
-    <c:autoTitleDeleted val="0"/>
-    <c:plotArea>
-      <c:layout/>
-      <c:pieChart>
-        <c:varyColors val="1"/>
-        <c:ser>
-          <c:idx val="0"/>
-          <c:order val="0"/>
-          <c:tx>
-            <c:strRef>
-              <c:f>'Total INCMIN by Race'!$N$7</c:f>
-              <c:strCache>
-                <c:ptCount val="1"/>
-                <c:pt idx="0">
-                  <c:v>Grand Total</c:v>
-                </c:pt>
-              </c:strCache>
-            </c:strRef>
-          </c:tx>
-          <c:cat>
-            <c:strRef>
-              <c:f>'Total INCMIN by Race'!$O$4:$R$4</c:f>
-              <c:strCache>
-                <c:ptCount val="4"/>
-                <c:pt idx="0">
-                  <c:v>Asian</c:v>
-                </c:pt>
-                <c:pt idx="1">
-                  <c:v>White</c:v>
-                </c:pt>
-                <c:pt idx="2">
-                  <c:v>Black</c:v>
-                </c:pt>
-                <c:pt idx="3">
-                  <c:v>Am Indian</c:v>
-                </c:pt>
-              </c:strCache>
-            </c:strRef>
-          </c:cat>
-          <c:val>
-            <c:numRef>
-              <c:f>'Total INCMIN by Race'!$O$7:$R$7</c:f>
-              <c:numCache>
-                <c:formatCode>General</c:formatCode>
-                <c:ptCount val="4"/>
-                <c:pt idx="0">
-                  <c:v>158908.888888889</c:v>
-                </c:pt>
-                <c:pt idx="1">
-                  <c:v>188.3138173302108</c:v>
-                </c:pt>
-                <c:pt idx="2">
-                  <c:v>1.6308011E6</c:v>
-                </c:pt>
-                <c:pt idx="3">
-                  <c:v>104837.5</c:v>
-                </c:pt>
-              </c:numCache>
-            </c:numRef>
-          </c:val>
-        </c:ser>
-        <c:dLbls>
-          <c:showLegendKey val="0"/>
-          <c:showVal val="0"/>
-          <c:showCatName val="0"/>
-          <c:showSerName val="0"/>
-          <c:showPercent val="0"/>
-          <c:showBubbleSize val="0"/>
-          <c:showLeaderLines val="1"/>
-        </c:dLbls>
-        <c:firstSliceAng val="0"/>
-      </c:pieChart>
-    </c:plotArea>
-    <c:legend>
-      <c:legendPos val="r"/>
-      <c:layout/>
-      <c:overlay val="0"/>
-      <c:txPr>
-        <a:bodyPr/>
-        <a:lstStyle/>
-        <a:p>
-          <a:pPr>
-            <a:defRPr sz="1800"/>
-          </a:pPr>
-          <a:endParaRPr lang="en-US"/>
-        </a:p>
-      </c:txPr>
-    </c:legend>
-    <c:plotVisOnly val="1"/>
-    <c:dispBlanksAs val="gap"/>
-    <c:showDLblsOverMax val="0"/>
-  </c:chart>
-  <c:txPr>
-    <a:bodyPr/>
-    <a:lstStyle/>
-    <a:p>
-      <a:pPr>
-        <a:defRPr>
-          <a:latin typeface="Arial"/>
-          <a:cs typeface="Arial"/>
-        </a:defRPr>
-      </a:pPr>
-      <a:endParaRPr lang="en-US"/>
-    </a:p>
-  </c:txPr>
-  <c:externalData r:id="rId1">
-    <c:autoUpdate val="0"/>
-  </c:externalData>
-</c:chartSpace>
 </file>
 
 <file path=ppt/notesMasters/notesMaster1.xml><?xml version="1.0" encoding="utf-8"?>
@@ -5446,7 +3611,7 @@
         </p:nvSpPr>
         <p:spPr>
           <a:xfrm>
-            <a:off x="19707473" y="29538535"/>
+            <a:off x="19707473" y="27682717"/>
             <a:ext cx="11478588" cy="1736007"/>
           </a:xfrm>
           <a:prstGeom prst="rect">
@@ -5482,21 +3647,91 @@
                 <a:latin typeface="Arial Narrow"/>
                 <a:cs typeface="Arial Narrow"/>
               </a:rPr>
-              <a:t>“[method], using variables x, x, x, can </a:t>
-            </a:r>
-            <a:r>
-              <a:rPr lang="en-US" sz="3600" b="1" dirty="0" err="1" smtClean="0">
+              <a:t>“</a:t>
+            </a:r>
+            <a:r>
+              <a:rPr lang="en-US" sz="3600" b="1" u="sng" dirty="0">
                 <a:latin typeface="Arial Narrow"/>
                 <a:cs typeface="Arial Narrow"/>
               </a:rPr>
-              <a:t>predcict</a:t>
+              <a:t>C</a:t>
+            </a:r>
+            <a:r>
+              <a:rPr lang="en-US" sz="3600" b="1" u="sng" dirty="0" smtClean="0">
+                <a:latin typeface="Arial Narrow"/>
+                <a:cs typeface="Arial Narrow"/>
+              </a:rPr>
+              <a:t>4.5</a:t>
             </a:r>
             <a:r>
               <a:rPr lang="en-US" sz="3600" b="1" dirty="0" smtClean="0">
                 <a:latin typeface="Arial Narrow"/>
                 <a:cs typeface="Arial Narrow"/>
               </a:rPr>
-              <a:t> the criminal’s sentence with xx accuracy. ”</a:t>
+              <a:t>, </a:t>
+            </a:r>
+            <a:r>
+              <a:rPr lang="en-US" sz="3600" b="1" dirty="0" smtClean="0">
+                <a:latin typeface="Arial Narrow"/>
+                <a:cs typeface="Arial Narrow"/>
+              </a:rPr>
+              <a:t>using </a:t>
+            </a:r>
+            <a:r>
+              <a:rPr lang="en-US" sz="3600" b="1" dirty="0" smtClean="0">
+                <a:latin typeface="Arial Narrow"/>
+                <a:cs typeface="Arial Narrow"/>
+              </a:rPr>
+              <a:t>the </a:t>
+            </a:r>
+            <a:r>
+              <a:rPr lang="en-US" sz="3600" b="1" u="sng" dirty="0" smtClean="0">
+                <a:latin typeface="Arial Narrow"/>
+                <a:cs typeface="Arial Narrow"/>
+              </a:rPr>
+              <a:t>CRIME</a:t>
+            </a:r>
+            <a:r>
+              <a:rPr lang="en-US" sz="3600" b="1" dirty="0" smtClean="0">
+                <a:latin typeface="Arial Narrow"/>
+                <a:cs typeface="Arial Narrow"/>
+              </a:rPr>
+              <a:t> variable set, </a:t>
+            </a:r>
+            <a:r>
+              <a:rPr lang="en-US" sz="3600" b="1" dirty="0" smtClean="0">
+                <a:latin typeface="Arial Narrow"/>
+                <a:cs typeface="Arial Narrow"/>
+              </a:rPr>
+              <a:t>was able to predict the </a:t>
+            </a:r>
+            <a:r>
+              <a:rPr lang="en-US" sz="3600" b="1" dirty="0" smtClean="0">
+                <a:latin typeface="Arial Narrow"/>
+                <a:cs typeface="Arial Narrow"/>
+              </a:rPr>
+              <a:t>criminal’s sentence with </a:t>
+            </a:r>
+            <a:r>
+              <a:rPr lang="en-US" sz="3600" b="1" u="sng" dirty="0" smtClean="0">
+                <a:latin typeface="Arial Narrow"/>
+                <a:cs typeface="Arial Narrow"/>
+              </a:rPr>
+              <a:t>78.3%</a:t>
+            </a:r>
+            <a:r>
+              <a:rPr lang="en-US" sz="3600" b="1" u="sng" dirty="0" smtClean="0">
+                <a:latin typeface="Arial Narrow"/>
+                <a:cs typeface="Arial Narrow"/>
+              </a:rPr>
+              <a:t> </a:t>
+            </a:r>
+            <a:r>
+              <a:rPr lang="en-US" sz="3600" b="1" dirty="0" smtClean="0">
+                <a:latin typeface="Arial Narrow"/>
+                <a:cs typeface="Arial Narrow"/>
+              </a:rPr>
+              <a:t>accuracy. ”</a:t>
             </a:r>
             <a:endParaRPr lang="en-US" sz="3600" b="1" dirty="0">
               <a:latin typeface="Arial Narrow"/>
@@ -5539,7 +3774,7 @@
                 <a:latin typeface="Constantia"/>
                 <a:cs typeface="Constantia"/>
               </a:rPr>
-              <a:t>Sentencing</a:t>
+              <a:t>Sentences</a:t>
             </a:r>
             <a:endParaRPr lang="en-US" sz="15000" dirty="0">
               <a:latin typeface="Constantia"/>
@@ -5758,7 +3993,7 @@
         </p:nvSpPr>
         <p:spPr>
           <a:xfrm>
-            <a:off x="19707473" y="28624044"/>
+            <a:off x="19707473" y="26769446"/>
             <a:ext cx="6396346" cy="584776"/>
           </a:xfrm>
           <a:prstGeom prst="rect">
@@ -5794,7 +4029,7 @@
         </p:nvSpPr>
         <p:spPr>
           <a:xfrm>
-            <a:off x="19695528" y="19461178"/>
+            <a:off x="17463556" y="5013854"/>
             <a:ext cx="2039807" cy="584776"/>
           </a:xfrm>
           <a:prstGeom prst="rect">
@@ -5953,8 +4188,8 @@
         </p:nvSpPr>
         <p:spPr>
           <a:xfrm>
-            <a:off x="25779446" y="20553432"/>
-            <a:ext cx="5806183" cy="830997"/>
+            <a:off x="23616923" y="5830286"/>
+            <a:ext cx="6815408" cy="4154983"/>
           </a:xfrm>
           <a:prstGeom prst="rect">
             <a:avLst/>
@@ -5972,7 +4207,7 @@
                 <a:latin typeface="Arial"/>
                 <a:cs typeface="Arial"/>
               </a:rPr>
-              <a:t>TODO: some sort of conclusion after getting more data.</a:t>
+              <a:t>Linear SVM performed poorly across all variable sets. The other methods showed similar performance for given variable sets, with the C4.5 decision tree having the highest labeling accuracies across 10-fold cross validation. The CRIME set performed best, confirming that information about the crime itself, not the demographics of the criminal, is most important factor in determining the incarceration time. In fact, the pruned decision tree for BASE was exclusively composed of variables from CRIME. </a:t>
             </a:r>
             <a:endParaRPr lang="en-US" sz="2400" dirty="0">
               <a:latin typeface="Arial"/>
@@ -5989,8 +4224,8 @@
         </p:nvSpPr>
         <p:spPr>
           <a:xfrm>
-            <a:off x="19707473" y="31486204"/>
-            <a:ext cx="11945807" cy="1200328"/>
+            <a:off x="19707474" y="29796308"/>
+            <a:ext cx="11478588" cy="3416320"/>
           </a:xfrm>
           <a:prstGeom prst="rect">
             <a:avLst/>
@@ -6008,7 +4243,60 @@
                 <a:latin typeface="Arial"/>
                 <a:cs typeface="Arial"/>
               </a:rPr>
-              <a:t>We will repeat our experiments using varying subsets of variables, and include more variables describing aspects of the criminal, offense, and trial that we have not incorporated yet.</a:t>
+              <a:t>Our preliminary results suggest that justice is indeed administered “without </a:t>
+            </a:r>
+            <a:r>
+              <a:rPr lang="en-US" sz="2400" dirty="0" err="1" smtClean="0">
+                <a:latin typeface="Arial"/>
+                <a:cs typeface="Arial"/>
+              </a:rPr>
+              <a:t>repsect</a:t>
+            </a:r>
+            <a:r>
+              <a:rPr lang="en-US" sz="2400" dirty="0" smtClean="0">
+                <a:latin typeface="Arial"/>
+                <a:cs typeface="Arial"/>
+              </a:rPr>
+              <a:t> to persons.” Demographic facts about the offender were </a:t>
+            </a:r>
+            <a:r>
+              <a:rPr lang="en-US" sz="2400" dirty="0" smtClean="0">
+                <a:latin typeface="Arial"/>
+                <a:cs typeface="Arial"/>
+              </a:rPr>
+              <a:t>poor predictors for the sentence, while variables describing the crime were useful predictors. </a:t>
+            </a:r>
+          </a:p>
+          <a:p>
+            <a:r>
+              <a:rPr lang="en-US" sz="2400" dirty="0" smtClean="0">
+                <a:latin typeface="Arial"/>
+                <a:cs typeface="Arial"/>
+              </a:rPr>
+              <a:t>It is odd that the full decision tree using BASE is not equivalent to the CRIME tree, when the BASE tree only included variables from CRIME. This is likely the result of pruning and/or tie-breaking, and an issue we need to investigate.</a:t>
+            </a:r>
+          </a:p>
+          <a:p>
+            <a:r>
+              <a:rPr lang="en-US" sz="2400" dirty="0" smtClean="0">
+                <a:latin typeface="Arial"/>
+                <a:cs typeface="Arial"/>
+              </a:rPr>
+              <a:t>We </a:t>
+            </a:r>
+            <a:r>
+              <a:rPr lang="en-US" sz="2400" dirty="0" smtClean="0">
+                <a:latin typeface="Arial"/>
+                <a:cs typeface="Arial"/>
+              </a:rPr>
+              <a:t>will repeat our experiments using varying subsets of variables, and include more variables describing aspects of the criminal, offense, and trial that we have not incorporated yet</a:t>
+            </a:r>
+            <a:r>
+              <a:rPr lang="en-US" sz="2400" dirty="0" smtClean="0">
+                <a:latin typeface="Arial"/>
+                <a:cs typeface="Arial"/>
+              </a:rPr>
+              <a:t>. </a:t>
             </a:r>
             <a:endParaRPr lang="en-US" sz="2400" dirty="0">
               <a:latin typeface="Arial"/>
@@ -6053,94 +4341,6 @@
           </a:p>
         </p:txBody>
       </p:sp>
-      <p:graphicFrame>
-        <p:nvGraphicFramePr>
-          <p:cNvPr id="26" name="Chart 25"/>
-          <p:cNvGraphicFramePr/>
-          <p:nvPr>
-            <p:extLst>
-              <p:ext uri="{D42A27DB-BD31-4B8C-83A1-F6EECF244321}">
-                <p14:modId xmlns:p14="http://schemas.microsoft.com/office/powerpoint/2010/main" val="1754289304"/>
-              </p:ext>
-            </p:extLst>
-          </p:nvPr>
-        </p:nvGraphicFramePr>
-        <p:xfrm>
-          <a:off x="24693020" y="4957209"/>
-          <a:ext cx="5678052" cy="3963429"/>
-        </p:xfrm>
-        <a:graphic>
-          <a:graphicData uri="http://schemas.openxmlformats.org/drawingml/2006/chart">
-            <c:chart xmlns:c="http://schemas.openxmlformats.org/drawingml/2006/chart" xmlns:r="http://schemas.openxmlformats.org/officeDocument/2006/relationships" r:id="rId5"/>
-          </a:graphicData>
-        </a:graphic>
-      </p:graphicFrame>
-      <p:graphicFrame>
-        <p:nvGraphicFramePr>
-          <p:cNvPr id="27" name="Chart 26"/>
-          <p:cNvGraphicFramePr/>
-          <p:nvPr>
-            <p:extLst>
-              <p:ext uri="{D42A27DB-BD31-4B8C-83A1-F6EECF244321}">
-                <p14:modId xmlns:p14="http://schemas.microsoft.com/office/powerpoint/2010/main" val="2481506955"/>
-              </p:ext>
-            </p:extLst>
-          </p:nvPr>
-        </p:nvGraphicFramePr>
-        <p:xfrm>
-          <a:off x="17065969" y="6121761"/>
-          <a:ext cx="7058888" cy="3533110"/>
-        </p:xfrm>
-        <a:graphic>
-          <a:graphicData uri="http://schemas.openxmlformats.org/drawingml/2006/chart">
-            <c:chart xmlns:c="http://schemas.openxmlformats.org/drawingml/2006/chart" xmlns:r="http://schemas.openxmlformats.org/officeDocument/2006/relationships" r:id="rId6"/>
-          </a:graphicData>
-        </a:graphic>
-      </p:graphicFrame>
-      <p:graphicFrame>
-        <p:nvGraphicFramePr>
-          <p:cNvPr id="29" name="Chart 28"/>
-          <p:cNvGraphicFramePr/>
-          <p:nvPr>
-            <p:extLst>
-              <p:ext uri="{D42A27DB-BD31-4B8C-83A1-F6EECF244321}">
-                <p14:modId xmlns:p14="http://schemas.microsoft.com/office/powerpoint/2010/main" val="3214438485"/>
-              </p:ext>
-            </p:extLst>
-          </p:nvPr>
-        </p:nvGraphicFramePr>
-        <p:xfrm>
-          <a:off x="24693020" y="9248720"/>
-          <a:ext cx="5678052" cy="3201035"/>
-        </p:xfrm>
-        <a:graphic>
-          <a:graphicData uri="http://schemas.openxmlformats.org/drawingml/2006/chart">
-            <c:chart xmlns:c="http://schemas.openxmlformats.org/drawingml/2006/chart" xmlns:r="http://schemas.openxmlformats.org/officeDocument/2006/relationships" r:id="rId7"/>
-          </a:graphicData>
-        </a:graphic>
-      </p:graphicFrame>
-      <p:graphicFrame>
-        <p:nvGraphicFramePr>
-          <p:cNvPr id="30" name="Chart 29"/>
-          <p:cNvGraphicFramePr/>
-          <p:nvPr>
-            <p:extLst>
-              <p:ext uri="{D42A27DB-BD31-4B8C-83A1-F6EECF244321}">
-                <p14:modId xmlns:p14="http://schemas.microsoft.com/office/powerpoint/2010/main" val="2190212069"/>
-              </p:ext>
-            </p:extLst>
-          </p:nvPr>
-        </p:nvGraphicFramePr>
-        <p:xfrm>
-          <a:off x="16887209" y="9654871"/>
-          <a:ext cx="7226371" cy="2794884"/>
-        </p:xfrm>
-        <a:graphic>
-          <a:graphicData uri="http://schemas.openxmlformats.org/drawingml/2006/chart">
-            <c:chart xmlns:c="http://schemas.openxmlformats.org/drawingml/2006/chart" xmlns:r="http://schemas.openxmlformats.org/officeDocument/2006/relationships" r:id="rId8"/>
-          </a:graphicData>
-        </a:graphic>
-      </p:graphicFrame>
       <p:sp>
         <p:nvSpPr>
           <p:cNvPr id="32" name="TextBox 31"/>
@@ -6149,7 +4349,7 @@
         </p:nvSpPr>
         <p:spPr>
           <a:xfrm>
-            <a:off x="16887209" y="5013854"/>
+            <a:off x="1567975" y="15333419"/>
             <a:ext cx="3504608" cy="584776"/>
           </a:xfrm>
           <a:prstGeom prst="rect">
@@ -6186,7 +4386,7 @@
           <p:nvPr/>
         </p:nvPicPr>
         <p:blipFill>
-          <a:blip r:embed="rId9">
+          <a:blip r:embed="rId5">
             <a:extLst>
               <a:ext uri="{28A0092B-C50C-407E-A947-70E740481C1C}">
                 <a14:useLocalDpi xmlns:a14="http://schemas.microsoft.com/office/drawing/2010/main" val="0"/>
@@ -6199,8 +4399,8 @@
         </p:blipFill>
         <p:spPr>
           <a:xfrm>
-            <a:off x="1202130" y="18123906"/>
-            <a:ext cx="14224351" cy="6554045"/>
+            <a:off x="19932353" y="20431867"/>
+            <a:ext cx="10863036" cy="5005278"/>
           </a:xfrm>
           <a:prstGeom prst="rect">
             <a:avLst/>
@@ -6215,7 +4415,7 @@
         </p:nvSpPr>
         <p:spPr>
           <a:xfrm>
-            <a:off x="10034096" y="24999551"/>
+            <a:off x="26205308" y="19970716"/>
             <a:ext cx="5806183" cy="461665"/>
           </a:xfrm>
           <a:prstGeom prst="rect">
@@ -6230,11 +4430,28 @@
           <a:lstStyle/>
           <a:p>
             <a:r>
+              <a:rPr lang="en-US" sz="2400" dirty="0" err="1">
+                <a:latin typeface="Wingdings"/>
+              </a:rPr>
+              <a:t>ê</a:t>
+            </a:r>
+            <a:r>
+              <a:rPr lang="en-US" sz="2400" dirty="0"/>
+              <a:t> </a:t>
+            </a:r>
+            <a:r>
               <a:rPr lang="en-US" sz="2400" i="1" dirty="0" smtClean="0">
                 <a:latin typeface="Arial"/>
                 <a:cs typeface="Arial"/>
               </a:rPr>
-              <a:t>Top part of decision tree using DEMO</a:t>
+              <a:t>Top </a:t>
+            </a:r>
+            <a:r>
+              <a:rPr lang="en-US" sz="2400" i="1" dirty="0" smtClean="0">
+                <a:latin typeface="Arial"/>
+                <a:cs typeface="Arial"/>
+              </a:rPr>
+              <a:t>part of decision tree using DEMO</a:t>
             </a:r>
             <a:endParaRPr lang="en-US" sz="2400" i="1" dirty="0">
               <a:latin typeface="Arial"/>
@@ -6370,7 +4587,28 @@
                 <a:latin typeface="Arial"/>
                 <a:cs typeface="Arial"/>
               </a:rPr>
-              <a:t>Bayes, Decision tree (C4.5), Linear SVM, </a:t>
+              <a:t>Orange </a:t>
+            </a:r>
+            <a:r>
+              <a:rPr lang="en-US" sz="2400" dirty="0" smtClean="0">
+                <a:latin typeface="Arial"/>
+                <a:cs typeface="Arial"/>
+              </a:rPr>
+              <a:t>software: </a:t>
+            </a:r>
+            <a:r>
+              <a:rPr lang="en-US" sz="2400" dirty="0" smtClean="0">
+                <a:latin typeface="Arial"/>
+                <a:cs typeface="Arial"/>
+              </a:rPr>
+              <a:t>Bayes</a:t>
+            </a:r>
+            <a:r>
+              <a:rPr lang="en-US" sz="2400" dirty="0" smtClean="0">
+                <a:latin typeface="Arial"/>
+                <a:cs typeface="Arial"/>
+              </a:rPr>
+              <a:t>, Decision tree (C4.5), Linear SVM, </a:t>
             </a:r>
             <a:r>
               <a:rPr lang="en-US" sz="2400" dirty="0" err="1" smtClean="0">
@@ -6468,84 +4706,42 @@
                 <a:latin typeface="Arial"/>
                 <a:cs typeface="Arial"/>
               </a:rPr>
-              <a:t>(Statutory offense grade)</a:t>
+              <a:t>(</a:t>
+            </a:r>
+            <a:r>
+              <a:rPr lang="en-US" sz="2400" dirty="0" err="1" smtClean="0">
+                <a:latin typeface="Arial"/>
+                <a:cs typeface="Arial"/>
+              </a:rPr>
+              <a:t>statutory</a:t>
             </a:r>
             <a:r>
               <a:rPr lang="en-US" sz="2400" dirty="0" smtClean="0">
                 <a:latin typeface="Arial"/>
                 <a:cs typeface="Arial"/>
               </a:rPr>
-              <a:t>, COMPLETE </a:t>
+              <a:t> </a:t>
             </a:r>
             <a:r>
               <a:rPr lang="en-US" sz="2400" dirty="0" smtClean="0">
                 <a:latin typeface="Arial"/>
                 <a:cs typeface="Arial"/>
               </a:rPr>
-              <a:t>(offense completed/inchoate)</a:t>
+              <a:t>offense grade), COMPLETE (offense completed/inchoate), DOS_UNO (date of sentence), COUNTY (sentencing county), PCSOFF (offense code), PCSSUB (offense </a:t>
+            </a:r>
+            <a:r>
+              <a:rPr lang="en-US" sz="2400" dirty="0" err="1" smtClean="0">
+                <a:latin typeface="Arial"/>
+                <a:cs typeface="Arial"/>
+              </a:rPr>
+              <a:t>subcode</a:t>
             </a:r>
             <a:r>
               <a:rPr lang="en-US" sz="2400" dirty="0" smtClean="0">
                 <a:latin typeface="Arial"/>
                 <a:cs typeface="Arial"/>
               </a:rPr>
-              <a:t>, DOS_UNO (date of sentence), COUNTY </a:t>
-            </a:r>
-            <a:r>
-              <a:rPr lang="en-US" sz="2400" dirty="0" smtClean="0">
-                <a:latin typeface="Arial"/>
-                <a:cs typeface="Arial"/>
-              </a:rPr>
-              <a:t>(sentencing county)</a:t>
-            </a:r>
-            <a:r>
-              <a:rPr lang="en-US" sz="2400" dirty="0" smtClean="0">
-                <a:latin typeface="Arial"/>
-                <a:cs typeface="Arial"/>
-              </a:rPr>
-              <a:t>, PCSOFF </a:t>
-            </a:r>
-            <a:r>
-              <a:rPr lang="en-US" sz="2400" dirty="0" smtClean="0">
-                <a:latin typeface="Arial"/>
-                <a:cs typeface="Arial"/>
-              </a:rPr>
-              <a:t>(offense code)</a:t>
-            </a:r>
-            <a:r>
-              <a:rPr lang="en-US" sz="2400" dirty="0" smtClean="0">
-                <a:latin typeface="Arial"/>
-                <a:cs typeface="Arial"/>
-              </a:rPr>
-              <a:t>, PCSSUB </a:t>
-            </a:r>
-            <a:r>
-              <a:rPr lang="en-US" sz="2400" dirty="0" smtClean="0">
-                <a:latin typeface="Arial"/>
-                <a:cs typeface="Arial"/>
-              </a:rPr>
-              <a:t>(offense </a:t>
-            </a:r>
-            <a:r>
-              <a:rPr lang="en-US" sz="2400" dirty="0" err="1" smtClean="0">
-                <a:latin typeface="Arial"/>
-                <a:cs typeface="Arial"/>
-              </a:rPr>
-              <a:t>subcode</a:t>
-            </a:r>
-            <a:r>
-              <a:rPr lang="en-US" sz="2400" dirty="0" smtClean="0">
-                <a:latin typeface="Arial"/>
-                <a:cs typeface="Arial"/>
-              </a:rPr>
-              <a:t>)</a:t>
-            </a:r>
-            <a:r>
-              <a:rPr lang="en-US" sz="2400" dirty="0" smtClean="0">
-                <a:latin typeface="Arial"/>
-                <a:cs typeface="Arial"/>
-              </a:rPr>
-              <a:t>, DOF_UNO (date of offense), DISP (disposition)</a:t>
+              <a:t>), DOF_UNO (date of offense), DISP (disposition)</a:t>
             </a:r>
           </a:p>
           <a:p>
@@ -6583,13 +4779,13 @@
           <p:nvPr>
             <p:extLst>
               <p:ext uri="{D42A27DB-BD31-4B8C-83A1-F6EECF244321}">
-                <p14:modId xmlns:p14="http://schemas.microsoft.com/office/powerpoint/2010/main" val="600319433"/>
+                <p14:modId xmlns:p14="http://schemas.microsoft.com/office/powerpoint/2010/main" val="2017815456"/>
               </p:ext>
             </p:extLst>
           </p:nvPr>
         </p:nvGraphicFramePr>
         <p:xfrm>
-          <a:off x="19707473" y="20553432"/>
+          <a:off x="17611758" y="5913400"/>
           <a:ext cx="5354722" cy="5943600"/>
         </p:xfrm>
         <a:graphic>
@@ -6929,6 +5125,13 @@
                     <a:bodyPr/>
                     <a:lstStyle/>
                     <a:p>
+                      <a:r>
+                        <a:rPr lang="en-US" sz="2400" dirty="0" smtClean="0">
+                          <a:latin typeface="Arial"/>
+                          <a:cs typeface="Arial"/>
+                        </a:rPr>
+                        <a:t>0.772</a:t>
+                      </a:r>
                       <a:endParaRPr lang="en-US" sz="2400" dirty="0">
                         <a:latin typeface="Arial"/>
                         <a:cs typeface="Arial"/>
@@ -6974,6 +5177,13 @@
                     <a:bodyPr/>
                     <a:lstStyle/>
                     <a:p>
+                      <a:r>
+                        <a:rPr lang="en-US" sz="2400" dirty="0" smtClean="0">
+                          <a:latin typeface="Arial"/>
+                          <a:cs typeface="Arial"/>
+                        </a:rPr>
+                        <a:t>0.783</a:t>
+                      </a:r>
                       <a:endParaRPr lang="en-US" sz="2400" dirty="0">
                         <a:latin typeface="Arial"/>
                         <a:cs typeface="Arial"/>
@@ -7019,6 +5229,13 @@
                     <a:bodyPr/>
                     <a:lstStyle/>
                     <a:p>
+                      <a:r>
+                        <a:rPr lang="en-US" sz="2400" dirty="0" smtClean="0">
+                          <a:latin typeface="Arial"/>
+                          <a:cs typeface="Arial"/>
+                        </a:rPr>
+                        <a:t>0.583</a:t>
+                      </a:r>
                       <a:endParaRPr lang="en-US" sz="2400" dirty="0">
                         <a:latin typeface="Arial"/>
                         <a:cs typeface="Arial"/>
@@ -7064,6 +5281,13 @@
                     <a:bodyPr/>
                     <a:lstStyle/>
                     <a:p>
+                      <a:r>
+                        <a:rPr lang="en-US" sz="2400" dirty="0" smtClean="0">
+                          <a:latin typeface="Arial"/>
+                          <a:cs typeface="Arial"/>
+                        </a:rPr>
+                        <a:t>0.769</a:t>
+                      </a:r>
                       <a:endParaRPr lang="en-US" sz="2400" dirty="0">
                         <a:latin typeface="Arial"/>
                         <a:cs typeface="Arial"/>
@@ -7084,7 +5308,7 @@
                           <a:latin typeface="Arial"/>
                           <a:cs typeface="Arial"/>
                         </a:rPr>
-                        <a:t>RACE</a:t>
+                        <a:t>BASE</a:t>
                       </a:r>
                       <a:endParaRPr lang="en-US" sz="2400" dirty="0">
                         <a:latin typeface="Arial"/>
@@ -7119,6 +5343,13 @@
                     <a:bodyPr/>
                     <a:lstStyle/>
                     <a:p>
+                      <a:r>
+                        <a:rPr lang="en-US" sz="2400" dirty="0" smtClean="0">
+                          <a:latin typeface="Arial"/>
+                          <a:cs typeface="Arial"/>
+                        </a:rPr>
+                        <a:t>0.761</a:t>
+                      </a:r>
                       <a:endParaRPr lang="en-US" sz="2400" dirty="0">
                         <a:latin typeface="Arial"/>
                         <a:cs typeface="Arial"/>
@@ -7164,6 +5395,13 @@
                     <a:bodyPr/>
                     <a:lstStyle/>
                     <a:p>
+                      <a:r>
+                        <a:rPr lang="en-US" sz="2400" dirty="0" smtClean="0">
+                          <a:latin typeface="Arial"/>
+                          <a:cs typeface="Arial"/>
+                        </a:rPr>
+                        <a:t>0.774</a:t>
+                      </a:r>
                       <a:endParaRPr lang="en-US" sz="2400" dirty="0">
                         <a:latin typeface="Arial"/>
                         <a:cs typeface="Arial"/>
@@ -7209,6 +5447,13 @@
                     <a:bodyPr/>
                     <a:lstStyle/>
                     <a:p>
+                      <a:r>
+                        <a:rPr lang="en-US" sz="2400" dirty="0" smtClean="0">
+                          <a:latin typeface="Arial"/>
+                          <a:cs typeface="Arial"/>
+                        </a:rPr>
+                        <a:t>0.589</a:t>
+                      </a:r>
                       <a:endParaRPr lang="en-US" sz="2400" dirty="0">
                         <a:latin typeface="Arial"/>
                         <a:cs typeface="Arial"/>
@@ -7254,6 +5499,13 @@
                     <a:bodyPr/>
                     <a:lstStyle/>
                     <a:p>
+                      <a:r>
+                        <a:rPr lang="en-US" sz="2400" dirty="0" smtClean="0">
+                          <a:latin typeface="Arial"/>
+                          <a:cs typeface="Arial"/>
+                        </a:rPr>
+                        <a:t>0.773</a:t>
+                      </a:r>
                       <a:endParaRPr lang="en-US" sz="2400" dirty="0">
                         <a:latin typeface="Arial"/>
                         <a:cs typeface="Arial"/>
@@ -7275,10 +5527,10 @@
         </p:nvGrpSpPr>
         <p:grpSpPr>
           <a:xfrm>
-            <a:off x="25379878" y="13046061"/>
-            <a:ext cx="5806183" cy="5981812"/>
-            <a:chOff x="27607363" y="13802639"/>
-            <a:chExt cx="5806183" cy="5981812"/>
+            <a:off x="915180" y="16161964"/>
+            <a:ext cx="9973573" cy="7991499"/>
+            <a:chOff x="27607363" y="14479153"/>
+            <a:chExt cx="5806183" cy="5140603"/>
           </a:xfrm>
         </p:grpSpPr>
         <p:pic>
@@ -7289,22 +5541,21 @@
             </p:cNvPicPr>
             <p:nvPr/>
           </p:nvPicPr>
-          <p:blipFill>
-            <a:blip r:embed="rId10">
+          <p:blipFill rotWithShape="1">
+            <a:blip r:embed="rId6">
               <a:extLst>
                 <a:ext uri="{28A0092B-C50C-407E-A947-70E740481C1C}">
                   <a14:useLocalDpi xmlns:a14="http://schemas.microsoft.com/office/drawing/2010/main" val="0"/>
                 </a:ext>
               </a:extLst>
             </a:blip>
-            <a:stretch>
-              <a:fillRect/>
-            </a:stretch>
+            <a:srcRect t="11319" b="10039"/>
+            <a:stretch/>
           </p:blipFill>
           <p:spPr>
             <a:xfrm>
-              <a:off x="27607363" y="13802639"/>
-              <a:ext cx="4618172" cy="5976458"/>
+              <a:off x="27607363" y="14479153"/>
+              <a:ext cx="4618172" cy="4699997"/>
             </a:xfrm>
             <a:prstGeom prst="rect">
               <a:avLst/>
@@ -7350,7 +5601,7 @@
           <p:spPr>
             <a:xfrm>
               <a:off x="27607363" y="19322786"/>
-              <a:ext cx="5806183" cy="461665"/>
+              <a:ext cx="5806183" cy="296970"/>
             </a:xfrm>
             <a:prstGeom prst="rect">
               <a:avLst/>
@@ -7364,11 +5615,28 @@
             <a:lstStyle/>
             <a:p>
               <a:r>
+                <a:rPr lang="en-US" sz="2400" dirty="0" err="1">
+                  <a:latin typeface="Wingdings"/>
+                </a:rPr>
+                <a:t>é</a:t>
+              </a:r>
+              <a:r>
+                <a:rPr lang="en-US" sz="2400" dirty="0"/>
+                <a:t> </a:t>
+              </a:r>
+              <a:r>
                 <a:rPr lang="en-US" sz="2400" i="1" dirty="0" smtClean="0">
                   <a:latin typeface="Arial"/>
                   <a:cs typeface="Arial"/>
                 </a:rPr>
-                <a:t>Variable Correlation Map</a:t>
+                <a:t>Variable </a:t>
+              </a:r>
+              <a:r>
+                <a:rPr lang="en-US" sz="2400" i="1" dirty="0" smtClean="0">
+                  <a:latin typeface="Arial"/>
+                  <a:cs typeface="Arial"/>
+                </a:rPr>
+                <a:t>Correlation Map</a:t>
               </a:r>
               <a:endParaRPr lang="en-US" sz="2400" i="1" dirty="0">
                 <a:latin typeface="Arial"/>
@@ -7386,7 +5654,7 @@
         </p:nvSpPr>
         <p:spPr>
           <a:xfrm>
-            <a:off x="9686675" y="14466215"/>
+            <a:off x="6344671" y="24964632"/>
             <a:ext cx="6772525" cy="3908763"/>
           </a:xfrm>
           <a:prstGeom prst="rect">
@@ -7589,6 +5857,295 @@
               </a:solidFill>
               <a:latin typeface="Century Gothic"/>
               <a:cs typeface="Arial Narrow"/>
+            </a:endParaRPr>
+          </a:p>
+        </p:txBody>
+      </p:sp>
+      <p:pic>
+        <p:nvPicPr>
+          <p:cNvPr id="2" name="Picture 1" descr="dtree_crime.png"/>
+          <p:cNvPicPr>
+            <a:picLocks noChangeAspect="1"/>
+          </p:cNvPicPr>
+          <p:nvPr/>
+        </p:nvPicPr>
+        <p:blipFill>
+          <a:blip r:embed="rId7">
+            <a:extLst>
+              <a:ext uri="{28A0092B-C50C-407E-A947-70E740481C1C}">
+                <a14:useLocalDpi xmlns:a14="http://schemas.microsoft.com/office/drawing/2010/main" val="0"/>
+              </a:ext>
+            </a:extLst>
+          </a:blip>
+          <a:stretch>
+            <a:fillRect/>
+          </a:stretch>
+        </p:blipFill>
+        <p:spPr>
+          <a:xfrm>
+            <a:off x="19503363" y="12848597"/>
+            <a:ext cx="5854700" cy="5219700"/>
+          </a:xfrm>
+          <a:prstGeom prst="rect">
+            <a:avLst/>
+          </a:prstGeom>
+        </p:spPr>
+      </p:pic>
+      <p:pic>
+        <p:nvPicPr>
+          <p:cNvPr id="5" name="Picture 4" descr="dtree_base.png"/>
+          <p:cNvPicPr>
+            <a:picLocks noChangeAspect="1"/>
+          </p:cNvPicPr>
+          <p:nvPr/>
+        </p:nvPicPr>
+        <p:blipFill>
+          <a:blip r:embed="rId8">
+            <a:extLst>
+              <a:ext uri="{28A0092B-C50C-407E-A947-70E740481C1C}">
+                <a14:useLocalDpi xmlns:a14="http://schemas.microsoft.com/office/drawing/2010/main" val="0"/>
+              </a:ext>
+            </a:extLst>
+          </a:blip>
+          <a:stretch>
+            <a:fillRect/>
+          </a:stretch>
+        </p:blipFill>
+        <p:spPr>
+          <a:xfrm>
+            <a:off x="25753489" y="11362697"/>
+            <a:ext cx="5041900" cy="6705600"/>
+          </a:xfrm>
+          <a:prstGeom prst="rect">
+            <a:avLst/>
+          </a:prstGeom>
+        </p:spPr>
+      </p:pic>
+      <p:grpSp>
+        <p:nvGrpSpPr>
+          <p:cNvPr id="42" name="Group 41"/>
+          <p:cNvGrpSpPr/>
+          <p:nvPr/>
+        </p:nvGrpSpPr>
+        <p:grpSpPr>
+          <a:xfrm>
+            <a:off x="9142138" y="16102602"/>
+            <a:ext cx="9484718" cy="6725799"/>
+            <a:chOff x="9537258" y="18979816"/>
+            <a:chExt cx="9484718" cy="6725799"/>
+          </a:xfrm>
+        </p:grpSpPr>
+        <p:grpSp>
+          <p:nvGrpSpPr>
+            <p:cNvPr id="40" name="Group 39"/>
+            <p:cNvGrpSpPr/>
+            <p:nvPr/>
+          </p:nvGrpSpPr>
+          <p:grpSpPr>
+            <a:xfrm>
+              <a:off x="9537258" y="18979816"/>
+              <a:ext cx="9484718" cy="6725799"/>
+              <a:chOff x="7130864" y="19383204"/>
+              <a:chExt cx="9484718" cy="6725799"/>
+            </a:xfrm>
+          </p:grpSpPr>
+          <p:pic>
+            <p:nvPicPr>
+              <p:cNvPr id="11" name="Picture 10"/>
+              <p:cNvPicPr>
+                <a:picLocks noChangeAspect="1"/>
+              </p:cNvPicPr>
+              <p:nvPr/>
+            </p:nvPicPr>
+            <p:blipFill>
+              <a:blip r:embed="rId9"/>
+              <a:stretch>
+                <a:fillRect/>
+              </a:stretch>
+            </p:blipFill>
+            <p:spPr>
+              <a:xfrm>
+                <a:off x="7130864" y="19383204"/>
+                <a:ext cx="9484718" cy="6725799"/>
+              </a:xfrm>
+              <a:prstGeom prst="rect">
+                <a:avLst/>
+              </a:prstGeom>
+            </p:spPr>
+          </p:pic>
+          <p:pic>
+            <p:nvPicPr>
+              <p:cNvPr id="28" name="Picture 27"/>
+              <p:cNvPicPr>
+                <a:picLocks noChangeAspect="1"/>
+              </p:cNvPicPr>
+              <p:nvPr/>
+            </p:nvPicPr>
+            <p:blipFill>
+              <a:blip r:embed="rId10"/>
+              <a:stretch>
+                <a:fillRect/>
+              </a:stretch>
+            </p:blipFill>
+            <p:spPr>
+              <a:xfrm>
+                <a:off x="7130864" y="20784264"/>
+                <a:ext cx="1610022" cy="603758"/>
+              </a:xfrm>
+              <a:prstGeom prst="rect">
+                <a:avLst/>
+              </a:prstGeom>
+            </p:spPr>
+          </p:pic>
+        </p:grpSp>
+        <p:sp>
+          <p:nvSpPr>
+            <p:cNvPr id="41" name="TextBox 40"/>
+            <p:cNvSpPr txBox="1"/>
+            <p:nvPr/>
+          </p:nvSpPr>
+          <p:spPr>
+            <a:xfrm>
+              <a:off x="9537258" y="18979816"/>
+              <a:ext cx="2643275" cy="1200328"/>
+            </a:xfrm>
+            <a:prstGeom prst="rect">
+              <a:avLst/>
+            </a:prstGeom>
+            <a:solidFill>
+              <a:srgbClr val="FFFFFF"/>
+            </a:solidFill>
+          </p:spPr>
+          <p:txBody>
+            <a:bodyPr wrap="square" rtlCol="0">
+              <a:spAutoFit/>
+            </a:bodyPr>
+            <a:lstStyle/>
+            <a:p>
+              <a:r>
+                <a:rPr lang="en-US" sz="2400" i="1" dirty="0" smtClean="0">
+                  <a:latin typeface="Arial"/>
+                  <a:cs typeface="Arial"/>
+                </a:rPr>
+                <a:t>Average </a:t>
+              </a:r>
+              <a:r>
+                <a:rPr lang="en-US" sz="2400" i="1" dirty="0" smtClean="0">
+                  <a:latin typeface="Arial"/>
+                  <a:cs typeface="Arial"/>
+                </a:rPr>
+                <a:t>INCMIN by RACE and GRADE</a:t>
+              </a:r>
+              <a:endParaRPr lang="en-US" sz="2400" i="1" dirty="0">
+                <a:latin typeface="Arial"/>
+                <a:cs typeface="Arial"/>
+              </a:endParaRPr>
+            </a:p>
+          </p:txBody>
+        </p:sp>
+      </p:grpSp>
+      <p:sp>
+        <p:nvSpPr>
+          <p:cNvPr id="43" name="TextBox 42"/>
+          <p:cNvSpPr txBox="1"/>
+          <p:nvPr/>
+        </p:nvSpPr>
+        <p:spPr>
+          <a:xfrm>
+            <a:off x="19503363" y="18369487"/>
+            <a:ext cx="5806183" cy="461665"/>
+          </a:xfrm>
+          <a:prstGeom prst="rect">
+            <a:avLst/>
+          </a:prstGeom>
+          <a:noFill/>
+        </p:spPr>
+        <p:txBody>
+          <a:bodyPr wrap="square" rtlCol="0">
+            <a:spAutoFit/>
+          </a:bodyPr>
+          <a:lstStyle/>
+          <a:p>
+            <a:r>
+              <a:rPr lang="en-US" sz="2400" dirty="0" err="1">
+                <a:latin typeface="Wingdings"/>
+              </a:rPr>
+              <a:t>é</a:t>
+            </a:r>
+            <a:r>
+              <a:rPr lang="en-US" sz="2400" dirty="0"/>
+              <a:t> </a:t>
+            </a:r>
+            <a:r>
+              <a:rPr lang="en-US" sz="2400" i="1" dirty="0" smtClean="0">
+                <a:latin typeface="Arial"/>
+                <a:cs typeface="Arial"/>
+              </a:rPr>
+              <a:t>Top </a:t>
+            </a:r>
+            <a:r>
+              <a:rPr lang="en-US" sz="2400" i="1" dirty="0" smtClean="0">
+                <a:latin typeface="Arial"/>
+                <a:cs typeface="Arial"/>
+              </a:rPr>
+              <a:t>part of decision tree using </a:t>
+            </a:r>
+            <a:r>
+              <a:rPr lang="en-US" sz="2400" i="1" dirty="0" smtClean="0">
+                <a:latin typeface="Arial"/>
+                <a:cs typeface="Arial"/>
+              </a:rPr>
+              <a:t>CRIME</a:t>
+            </a:r>
+            <a:endParaRPr lang="en-US" sz="2400" i="1" dirty="0">
+              <a:latin typeface="Arial"/>
+              <a:cs typeface="Arial"/>
+            </a:endParaRPr>
+          </a:p>
+        </p:txBody>
+      </p:sp>
+      <p:sp>
+        <p:nvSpPr>
+          <p:cNvPr id="44" name="TextBox 43"/>
+          <p:cNvSpPr txBox="1"/>
+          <p:nvPr/>
+        </p:nvSpPr>
+        <p:spPr>
+          <a:xfrm>
+            <a:off x="25753489" y="18406747"/>
+            <a:ext cx="4678842" cy="461665"/>
+          </a:xfrm>
+          <a:prstGeom prst="rect">
+            <a:avLst/>
+          </a:prstGeom>
+          <a:noFill/>
+        </p:spPr>
+        <p:txBody>
+          <a:bodyPr wrap="square" rtlCol="0">
+            <a:spAutoFit/>
+          </a:bodyPr>
+          <a:lstStyle/>
+          <a:p>
+            <a:r>
+              <a:rPr lang="en-US" sz="2400" dirty="0" err="1">
+                <a:latin typeface="Wingdings"/>
+              </a:rPr>
+              <a:t>é</a:t>
+            </a:r>
+            <a:r>
+              <a:rPr lang="en-US" sz="2400" dirty="0"/>
+              <a:t> </a:t>
+            </a:r>
+            <a:r>
+              <a:rPr lang="en-US" sz="2400" i="1" dirty="0" smtClean="0">
+                <a:latin typeface="Arial"/>
+                <a:cs typeface="Arial"/>
+              </a:rPr>
+              <a:t>Full decision tree using BASE</a:t>
+            </a:r>
+            <a:endParaRPr lang="en-US" sz="2400" i="1" dirty="0">
+              <a:latin typeface="Arial"/>
+              <a:cs typeface="Arial"/>
             </a:endParaRPr>
           </a:p>
         </p:txBody>

</xml_diff>